<commit_message>
fixed task in pptx #5
</commit_message>
<xml_diff>
--- a/docs/ETU DIT #5.pptx
+++ b/docs/ETU DIT #5.pptx
@@ -20,7 +20,7 @@
     <p:sldId id="266" r:id="rId15"/>
   </p:sldIdLst>
   <p:sldSz cx="11998325" cy="7559675"/>
-  <p:notesSz cx="7772400" cy="10058400"/>
+  <p:notesSz cx="7559675" cy="10691812"/>
 </p:presentation>
 </file>
 
@@ -88,7 +88,7 @@
           </a:bodyPr>
           <a:p>
             <a:pPr algn="ctr"/>
-            <a:endParaRPr b="0" lang="en-US" sz="4400" spc="-1" strike="noStrike">
+            <a:endParaRPr b="0" lang="ru-RU" sz="4400" spc="-1" strike="noStrike">
               <a:latin typeface="Arial"/>
             </a:endParaRPr>
           </a:p>
@@ -118,7 +118,7 @@
             <a:normAutofit/>
           </a:bodyPr>
           <a:p>
-            <a:endParaRPr b="0" lang="en-US" sz="3200" spc="-1" strike="noStrike">
+            <a:endParaRPr b="0" lang="ru-RU" sz="3200" spc="-1" strike="noStrike">
               <a:latin typeface="Arial"/>
             </a:endParaRPr>
           </a:p>
@@ -148,7 +148,7 @@
             <a:normAutofit/>
           </a:bodyPr>
           <a:p>
-            <a:endParaRPr b="0" lang="en-US" sz="3200" spc="-1" strike="noStrike">
+            <a:endParaRPr b="0" lang="ru-RU" sz="3200" spc="-1" strike="noStrike">
               <a:latin typeface="Arial"/>
             </a:endParaRPr>
           </a:p>
@@ -201,7 +201,7 @@
           </a:bodyPr>
           <a:p>
             <a:pPr algn="ctr"/>
-            <a:endParaRPr b="0" lang="en-US" sz="4400" spc="-1" strike="noStrike">
+            <a:endParaRPr b="0" lang="ru-RU" sz="4400" spc="-1" strike="noStrike">
               <a:latin typeface="Arial"/>
             </a:endParaRPr>
           </a:p>
@@ -231,7 +231,7 @@
             <a:normAutofit/>
           </a:bodyPr>
           <a:p>
-            <a:endParaRPr b="0" lang="en-US" sz="3200" spc="-1" strike="noStrike">
+            <a:endParaRPr b="0" lang="ru-RU" sz="3200" spc="-1" strike="noStrike">
               <a:latin typeface="Arial"/>
             </a:endParaRPr>
           </a:p>
@@ -261,7 +261,7 @@
             <a:normAutofit/>
           </a:bodyPr>
           <a:p>
-            <a:endParaRPr b="0" lang="en-US" sz="3200" spc="-1" strike="noStrike">
+            <a:endParaRPr b="0" lang="ru-RU" sz="3200" spc="-1" strike="noStrike">
               <a:latin typeface="Arial"/>
             </a:endParaRPr>
           </a:p>
@@ -291,7 +291,7 @@
             <a:normAutofit/>
           </a:bodyPr>
           <a:p>
-            <a:endParaRPr b="0" lang="en-US" sz="3200" spc="-1" strike="noStrike">
+            <a:endParaRPr b="0" lang="ru-RU" sz="3200" spc="-1" strike="noStrike">
               <a:latin typeface="Arial"/>
             </a:endParaRPr>
           </a:p>
@@ -321,7 +321,7 @@
             <a:normAutofit/>
           </a:bodyPr>
           <a:p>
-            <a:endParaRPr b="0" lang="en-US" sz="3200" spc="-1" strike="noStrike">
+            <a:endParaRPr b="0" lang="ru-RU" sz="3200" spc="-1" strike="noStrike">
               <a:latin typeface="Arial"/>
             </a:endParaRPr>
           </a:p>
@@ -374,7 +374,7 @@
           </a:bodyPr>
           <a:p>
             <a:pPr algn="ctr"/>
-            <a:endParaRPr b="0" lang="en-US" sz="4400" spc="-1" strike="noStrike">
+            <a:endParaRPr b="0" lang="ru-RU" sz="4400" spc="-1" strike="noStrike">
               <a:latin typeface="Arial"/>
             </a:endParaRPr>
           </a:p>
@@ -404,7 +404,7 @@
             <a:normAutofit/>
           </a:bodyPr>
           <a:p>
-            <a:endParaRPr b="0" lang="en-US" sz="3200" spc="-1" strike="noStrike">
+            <a:endParaRPr b="0" lang="ru-RU" sz="3200" spc="-1" strike="noStrike">
               <a:latin typeface="Arial"/>
             </a:endParaRPr>
           </a:p>
@@ -434,7 +434,7 @@
             <a:normAutofit/>
           </a:bodyPr>
           <a:p>
-            <a:endParaRPr b="0" lang="en-US" sz="3200" spc="-1" strike="noStrike">
+            <a:endParaRPr b="0" lang="ru-RU" sz="3200" spc="-1" strike="noStrike">
               <a:latin typeface="Arial"/>
             </a:endParaRPr>
           </a:p>
@@ -464,7 +464,7 @@
             <a:normAutofit/>
           </a:bodyPr>
           <a:p>
-            <a:endParaRPr b="0" lang="en-US" sz="3200" spc="-1" strike="noStrike">
+            <a:endParaRPr b="0" lang="ru-RU" sz="3200" spc="-1" strike="noStrike">
               <a:latin typeface="Arial"/>
             </a:endParaRPr>
           </a:p>
@@ -494,7 +494,7 @@
             <a:normAutofit/>
           </a:bodyPr>
           <a:p>
-            <a:endParaRPr b="0" lang="en-US" sz="3200" spc="-1" strike="noStrike">
+            <a:endParaRPr b="0" lang="ru-RU" sz="3200" spc="-1" strike="noStrike">
               <a:latin typeface="Arial"/>
             </a:endParaRPr>
           </a:p>
@@ -524,7 +524,7 @@
             <a:normAutofit/>
           </a:bodyPr>
           <a:p>
-            <a:endParaRPr b="0" lang="en-US" sz="3200" spc="-1" strike="noStrike">
+            <a:endParaRPr b="0" lang="ru-RU" sz="3200" spc="-1" strike="noStrike">
               <a:latin typeface="Arial"/>
             </a:endParaRPr>
           </a:p>
@@ -554,7 +554,7 @@
             <a:normAutofit/>
           </a:bodyPr>
           <a:p>
-            <a:endParaRPr b="0" lang="en-US" sz="3200" spc="-1" strike="noStrike">
+            <a:endParaRPr b="0" lang="ru-RU" sz="3200" spc="-1" strike="noStrike">
               <a:latin typeface="Arial"/>
             </a:endParaRPr>
           </a:p>
@@ -629,7 +629,7 @@
           </a:bodyPr>
           <a:p>
             <a:pPr algn="ctr"/>
-            <a:endParaRPr b="0" lang="en-US" sz="4400" spc="-1" strike="noStrike">
+            <a:endParaRPr b="0" lang="ru-RU" sz="4400" spc="-1" strike="noStrike">
               <a:latin typeface="Arial"/>
             </a:endParaRPr>
           </a:p>
@@ -660,7 +660,7 @@
           </a:bodyPr>
           <a:p>
             <a:pPr algn="ctr"/>
-            <a:endParaRPr b="0" lang="en-US" sz="3200" spc="-1" strike="noStrike">
+            <a:endParaRPr b="0" lang="ru-RU" sz="3200" spc="-1" strike="noStrike">
               <a:latin typeface="Arial"/>
             </a:endParaRPr>
           </a:p>
@@ -713,7 +713,7 @@
           </a:bodyPr>
           <a:p>
             <a:pPr algn="ctr"/>
-            <a:endParaRPr b="0" lang="en-US" sz="4400" spc="-1" strike="noStrike">
+            <a:endParaRPr b="0" lang="ru-RU" sz="4400" spc="-1" strike="noStrike">
               <a:latin typeface="Arial"/>
             </a:endParaRPr>
           </a:p>
@@ -743,7 +743,7 @@
             <a:normAutofit/>
           </a:bodyPr>
           <a:p>
-            <a:endParaRPr b="0" lang="en-US" sz="3200" spc="-1" strike="noStrike">
+            <a:endParaRPr b="0" lang="ru-RU" sz="3200" spc="-1" strike="noStrike">
               <a:latin typeface="Arial"/>
             </a:endParaRPr>
           </a:p>
@@ -796,7 +796,7 @@
           </a:bodyPr>
           <a:p>
             <a:pPr algn="ctr"/>
-            <a:endParaRPr b="0" lang="en-US" sz="4400" spc="-1" strike="noStrike">
+            <a:endParaRPr b="0" lang="ru-RU" sz="4400" spc="-1" strike="noStrike">
               <a:latin typeface="Arial"/>
             </a:endParaRPr>
           </a:p>
@@ -826,7 +826,7 @@
             <a:normAutofit/>
           </a:bodyPr>
           <a:p>
-            <a:endParaRPr b="0" lang="en-US" sz="3200" spc="-1" strike="noStrike">
+            <a:endParaRPr b="0" lang="ru-RU" sz="3200" spc="-1" strike="noStrike">
               <a:latin typeface="Arial"/>
             </a:endParaRPr>
           </a:p>
@@ -856,7 +856,7 @@
             <a:normAutofit/>
           </a:bodyPr>
           <a:p>
-            <a:endParaRPr b="0" lang="en-US" sz="3200" spc="-1" strike="noStrike">
+            <a:endParaRPr b="0" lang="ru-RU" sz="3200" spc="-1" strike="noStrike">
               <a:latin typeface="Arial"/>
             </a:endParaRPr>
           </a:p>
@@ -909,7 +909,7 @@
           </a:bodyPr>
           <a:p>
             <a:pPr algn="ctr"/>
-            <a:endParaRPr b="0" lang="en-US" sz="4400" spc="-1" strike="noStrike">
+            <a:endParaRPr b="0" lang="ru-RU" sz="4400" spc="-1" strike="noStrike">
               <a:latin typeface="Arial"/>
             </a:endParaRPr>
           </a:p>
@@ -962,7 +962,7 @@
           </a:bodyPr>
           <a:p>
             <a:pPr algn="ctr"/>
-            <a:endParaRPr b="0" lang="en-US" sz="3200" spc="-1" strike="noStrike">
+            <a:endParaRPr b="0" lang="ru-RU" sz="3200" spc="-1" strike="noStrike">
               <a:latin typeface="Arial"/>
             </a:endParaRPr>
           </a:p>
@@ -1015,7 +1015,7 @@
           </a:bodyPr>
           <a:p>
             <a:pPr algn="ctr"/>
-            <a:endParaRPr b="0" lang="en-US" sz="4400" spc="-1" strike="noStrike">
+            <a:endParaRPr b="0" lang="ru-RU" sz="4400" spc="-1" strike="noStrike">
               <a:latin typeface="Arial"/>
             </a:endParaRPr>
           </a:p>
@@ -1045,7 +1045,7 @@
             <a:normAutofit/>
           </a:bodyPr>
           <a:p>
-            <a:endParaRPr b="0" lang="en-US" sz="3200" spc="-1" strike="noStrike">
+            <a:endParaRPr b="0" lang="ru-RU" sz="3200" spc="-1" strike="noStrike">
               <a:latin typeface="Arial"/>
             </a:endParaRPr>
           </a:p>
@@ -1075,7 +1075,7 @@
             <a:normAutofit/>
           </a:bodyPr>
           <a:p>
-            <a:endParaRPr b="0" lang="en-US" sz="3200" spc="-1" strike="noStrike">
+            <a:endParaRPr b="0" lang="ru-RU" sz="3200" spc="-1" strike="noStrike">
               <a:latin typeface="Arial"/>
             </a:endParaRPr>
           </a:p>
@@ -1105,7 +1105,7 @@
             <a:normAutofit/>
           </a:bodyPr>
           <a:p>
-            <a:endParaRPr b="0" lang="en-US" sz="3200" spc="-1" strike="noStrike">
+            <a:endParaRPr b="0" lang="ru-RU" sz="3200" spc="-1" strike="noStrike">
               <a:latin typeface="Arial"/>
             </a:endParaRPr>
           </a:p>
@@ -1158,7 +1158,7 @@
           </a:bodyPr>
           <a:p>
             <a:pPr algn="ctr"/>
-            <a:endParaRPr b="0" lang="en-US" sz="4400" spc="-1" strike="noStrike">
+            <a:endParaRPr b="0" lang="ru-RU" sz="4400" spc="-1" strike="noStrike">
               <a:latin typeface="Arial"/>
             </a:endParaRPr>
           </a:p>
@@ -1189,7 +1189,7 @@
           </a:bodyPr>
           <a:p>
             <a:pPr algn="ctr"/>
-            <a:endParaRPr b="0" lang="en-US" sz="3200" spc="-1" strike="noStrike">
+            <a:endParaRPr b="0" lang="ru-RU" sz="3200" spc="-1" strike="noStrike">
               <a:latin typeface="Arial"/>
             </a:endParaRPr>
           </a:p>
@@ -1242,7 +1242,7 @@
           </a:bodyPr>
           <a:p>
             <a:pPr algn="ctr"/>
-            <a:endParaRPr b="0" lang="en-US" sz="4400" spc="-1" strike="noStrike">
+            <a:endParaRPr b="0" lang="ru-RU" sz="4400" spc="-1" strike="noStrike">
               <a:latin typeface="Arial"/>
             </a:endParaRPr>
           </a:p>
@@ -1272,7 +1272,7 @@
             <a:normAutofit/>
           </a:bodyPr>
           <a:p>
-            <a:endParaRPr b="0" lang="en-US" sz="3200" spc="-1" strike="noStrike">
+            <a:endParaRPr b="0" lang="ru-RU" sz="3200" spc="-1" strike="noStrike">
               <a:latin typeface="Arial"/>
             </a:endParaRPr>
           </a:p>
@@ -1302,7 +1302,7 @@
             <a:normAutofit/>
           </a:bodyPr>
           <a:p>
-            <a:endParaRPr b="0" lang="en-US" sz="3200" spc="-1" strike="noStrike">
+            <a:endParaRPr b="0" lang="ru-RU" sz="3200" spc="-1" strike="noStrike">
               <a:latin typeface="Arial"/>
             </a:endParaRPr>
           </a:p>
@@ -1332,7 +1332,7 @@
             <a:normAutofit/>
           </a:bodyPr>
           <a:p>
-            <a:endParaRPr b="0" lang="en-US" sz="3200" spc="-1" strike="noStrike">
+            <a:endParaRPr b="0" lang="ru-RU" sz="3200" spc="-1" strike="noStrike">
               <a:latin typeface="Arial"/>
             </a:endParaRPr>
           </a:p>
@@ -1385,7 +1385,7 @@
           </a:bodyPr>
           <a:p>
             <a:pPr algn="ctr"/>
-            <a:endParaRPr b="0" lang="en-US" sz="4400" spc="-1" strike="noStrike">
+            <a:endParaRPr b="0" lang="ru-RU" sz="4400" spc="-1" strike="noStrike">
               <a:latin typeface="Arial"/>
             </a:endParaRPr>
           </a:p>
@@ -1415,7 +1415,7 @@
             <a:normAutofit/>
           </a:bodyPr>
           <a:p>
-            <a:endParaRPr b="0" lang="en-US" sz="3200" spc="-1" strike="noStrike">
+            <a:endParaRPr b="0" lang="ru-RU" sz="3200" spc="-1" strike="noStrike">
               <a:latin typeface="Arial"/>
             </a:endParaRPr>
           </a:p>
@@ -1445,7 +1445,7 @@
             <a:normAutofit/>
           </a:bodyPr>
           <a:p>
-            <a:endParaRPr b="0" lang="en-US" sz="3200" spc="-1" strike="noStrike">
+            <a:endParaRPr b="0" lang="ru-RU" sz="3200" spc="-1" strike="noStrike">
               <a:latin typeface="Arial"/>
             </a:endParaRPr>
           </a:p>
@@ -1475,7 +1475,7 @@
             <a:normAutofit/>
           </a:bodyPr>
           <a:p>
-            <a:endParaRPr b="0" lang="en-US" sz="3200" spc="-1" strike="noStrike">
+            <a:endParaRPr b="0" lang="ru-RU" sz="3200" spc="-1" strike="noStrike">
               <a:latin typeface="Arial"/>
             </a:endParaRPr>
           </a:p>
@@ -1528,7 +1528,7 @@
           </a:bodyPr>
           <a:p>
             <a:pPr algn="ctr"/>
-            <a:endParaRPr b="0" lang="en-US" sz="4400" spc="-1" strike="noStrike">
+            <a:endParaRPr b="0" lang="ru-RU" sz="4400" spc="-1" strike="noStrike">
               <a:latin typeface="Arial"/>
             </a:endParaRPr>
           </a:p>
@@ -1558,7 +1558,7 @@
             <a:normAutofit/>
           </a:bodyPr>
           <a:p>
-            <a:endParaRPr b="0" lang="en-US" sz="3200" spc="-1" strike="noStrike">
+            <a:endParaRPr b="0" lang="ru-RU" sz="3200" spc="-1" strike="noStrike">
               <a:latin typeface="Arial"/>
             </a:endParaRPr>
           </a:p>
@@ -1588,7 +1588,7 @@
             <a:normAutofit/>
           </a:bodyPr>
           <a:p>
-            <a:endParaRPr b="0" lang="en-US" sz="3200" spc="-1" strike="noStrike">
+            <a:endParaRPr b="0" lang="ru-RU" sz="3200" spc="-1" strike="noStrike">
               <a:latin typeface="Arial"/>
             </a:endParaRPr>
           </a:p>
@@ -1641,7 +1641,7 @@
           </a:bodyPr>
           <a:p>
             <a:pPr algn="ctr"/>
-            <a:endParaRPr b="0" lang="en-US" sz="4400" spc="-1" strike="noStrike">
+            <a:endParaRPr b="0" lang="ru-RU" sz="4400" spc="-1" strike="noStrike">
               <a:latin typeface="Arial"/>
             </a:endParaRPr>
           </a:p>
@@ -1671,7 +1671,7 @@
             <a:normAutofit/>
           </a:bodyPr>
           <a:p>
-            <a:endParaRPr b="0" lang="en-US" sz="3200" spc="-1" strike="noStrike">
+            <a:endParaRPr b="0" lang="ru-RU" sz="3200" spc="-1" strike="noStrike">
               <a:latin typeface="Arial"/>
             </a:endParaRPr>
           </a:p>
@@ -1701,7 +1701,7 @@
             <a:normAutofit/>
           </a:bodyPr>
           <a:p>
-            <a:endParaRPr b="0" lang="en-US" sz="3200" spc="-1" strike="noStrike">
+            <a:endParaRPr b="0" lang="ru-RU" sz="3200" spc="-1" strike="noStrike">
               <a:latin typeface="Arial"/>
             </a:endParaRPr>
           </a:p>
@@ -1731,7 +1731,7 @@
             <a:normAutofit/>
           </a:bodyPr>
           <a:p>
-            <a:endParaRPr b="0" lang="en-US" sz="3200" spc="-1" strike="noStrike">
+            <a:endParaRPr b="0" lang="ru-RU" sz="3200" spc="-1" strike="noStrike">
               <a:latin typeface="Arial"/>
             </a:endParaRPr>
           </a:p>
@@ -1761,7 +1761,7 @@
             <a:normAutofit/>
           </a:bodyPr>
           <a:p>
-            <a:endParaRPr b="0" lang="en-US" sz="3200" spc="-1" strike="noStrike">
+            <a:endParaRPr b="0" lang="ru-RU" sz="3200" spc="-1" strike="noStrike">
               <a:latin typeface="Arial"/>
             </a:endParaRPr>
           </a:p>
@@ -1814,7 +1814,7 @@
           </a:bodyPr>
           <a:p>
             <a:pPr algn="ctr"/>
-            <a:endParaRPr b="0" lang="en-US" sz="4400" spc="-1" strike="noStrike">
+            <a:endParaRPr b="0" lang="ru-RU" sz="4400" spc="-1" strike="noStrike">
               <a:latin typeface="Arial"/>
             </a:endParaRPr>
           </a:p>
@@ -1844,7 +1844,7 @@
             <a:normAutofit/>
           </a:bodyPr>
           <a:p>
-            <a:endParaRPr b="0" lang="en-US" sz="3200" spc="-1" strike="noStrike">
+            <a:endParaRPr b="0" lang="ru-RU" sz="3200" spc="-1" strike="noStrike">
               <a:latin typeface="Arial"/>
             </a:endParaRPr>
           </a:p>
@@ -1874,7 +1874,7 @@
             <a:normAutofit/>
           </a:bodyPr>
           <a:p>
-            <a:endParaRPr b="0" lang="en-US" sz="3200" spc="-1" strike="noStrike">
+            <a:endParaRPr b="0" lang="ru-RU" sz="3200" spc="-1" strike="noStrike">
               <a:latin typeface="Arial"/>
             </a:endParaRPr>
           </a:p>
@@ -1904,7 +1904,7 @@
             <a:normAutofit/>
           </a:bodyPr>
           <a:p>
-            <a:endParaRPr b="0" lang="en-US" sz="3200" spc="-1" strike="noStrike">
+            <a:endParaRPr b="0" lang="ru-RU" sz="3200" spc="-1" strike="noStrike">
               <a:latin typeface="Arial"/>
             </a:endParaRPr>
           </a:p>
@@ -1934,7 +1934,7 @@
             <a:normAutofit/>
           </a:bodyPr>
           <a:p>
-            <a:endParaRPr b="0" lang="en-US" sz="3200" spc="-1" strike="noStrike">
+            <a:endParaRPr b="0" lang="ru-RU" sz="3200" spc="-1" strike="noStrike">
               <a:latin typeface="Arial"/>
             </a:endParaRPr>
           </a:p>
@@ -1964,7 +1964,7 @@
             <a:normAutofit/>
           </a:bodyPr>
           <a:p>
-            <a:endParaRPr b="0" lang="en-US" sz="3200" spc="-1" strike="noStrike">
+            <a:endParaRPr b="0" lang="ru-RU" sz="3200" spc="-1" strike="noStrike">
               <a:latin typeface="Arial"/>
             </a:endParaRPr>
           </a:p>
@@ -1994,7 +1994,7 @@
             <a:normAutofit/>
           </a:bodyPr>
           <a:p>
-            <a:endParaRPr b="0" lang="en-US" sz="3200" spc="-1" strike="noStrike">
+            <a:endParaRPr b="0" lang="ru-RU" sz="3200" spc="-1" strike="noStrike">
               <a:latin typeface="Arial"/>
             </a:endParaRPr>
           </a:p>
@@ -2069,7 +2069,7 @@
           </a:bodyPr>
           <a:p>
             <a:pPr algn="ctr"/>
-            <a:endParaRPr b="0" lang="en-US" sz="4400" spc="-1" strike="noStrike">
+            <a:endParaRPr b="0" lang="ru-RU" sz="4400" spc="-1" strike="noStrike">
               <a:latin typeface="Arial"/>
             </a:endParaRPr>
           </a:p>
@@ -2100,7 +2100,7 @@
           </a:bodyPr>
           <a:p>
             <a:pPr algn="ctr"/>
-            <a:endParaRPr b="0" lang="en-US" sz="3200" spc="-1" strike="noStrike">
+            <a:endParaRPr b="0" lang="ru-RU" sz="3200" spc="-1" strike="noStrike">
               <a:latin typeface="Arial"/>
             </a:endParaRPr>
           </a:p>
@@ -2153,7 +2153,7 @@
           </a:bodyPr>
           <a:p>
             <a:pPr algn="ctr"/>
-            <a:endParaRPr b="0" lang="en-US" sz="4400" spc="-1" strike="noStrike">
+            <a:endParaRPr b="0" lang="ru-RU" sz="4400" spc="-1" strike="noStrike">
               <a:latin typeface="Arial"/>
             </a:endParaRPr>
           </a:p>
@@ -2183,7 +2183,7 @@
             <a:normAutofit/>
           </a:bodyPr>
           <a:p>
-            <a:endParaRPr b="0" lang="en-US" sz="3200" spc="-1" strike="noStrike">
+            <a:endParaRPr b="0" lang="ru-RU" sz="3200" spc="-1" strike="noStrike">
               <a:latin typeface="Arial"/>
             </a:endParaRPr>
           </a:p>
@@ -2236,7 +2236,7 @@
           </a:bodyPr>
           <a:p>
             <a:pPr algn="ctr"/>
-            <a:endParaRPr b="0" lang="en-US" sz="4400" spc="-1" strike="noStrike">
+            <a:endParaRPr b="0" lang="ru-RU" sz="4400" spc="-1" strike="noStrike">
               <a:latin typeface="Arial"/>
             </a:endParaRPr>
           </a:p>
@@ -2266,7 +2266,7 @@
             <a:normAutofit/>
           </a:bodyPr>
           <a:p>
-            <a:endParaRPr b="0" lang="en-US" sz="3200" spc="-1" strike="noStrike">
+            <a:endParaRPr b="0" lang="ru-RU" sz="3200" spc="-1" strike="noStrike">
               <a:latin typeface="Arial"/>
             </a:endParaRPr>
           </a:p>
@@ -2296,7 +2296,7 @@
             <a:normAutofit/>
           </a:bodyPr>
           <a:p>
-            <a:endParaRPr b="0" lang="en-US" sz="3200" spc="-1" strike="noStrike">
+            <a:endParaRPr b="0" lang="ru-RU" sz="3200" spc="-1" strike="noStrike">
               <a:latin typeface="Arial"/>
             </a:endParaRPr>
           </a:p>
@@ -2349,7 +2349,7 @@
           </a:bodyPr>
           <a:p>
             <a:pPr algn="ctr"/>
-            <a:endParaRPr b="0" lang="en-US" sz="4400" spc="-1" strike="noStrike">
+            <a:endParaRPr b="0" lang="ru-RU" sz="4400" spc="-1" strike="noStrike">
               <a:latin typeface="Arial"/>
             </a:endParaRPr>
           </a:p>
@@ -2402,7 +2402,7 @@
           </a:bodyPr>
           <a:p>
             <a:pPr algn="ctr"/>
-            <a:endParaRPr b="0" lang="en-US" sz="4400" spc="-1" strike="noStrike">
+            <a:endParaRPr b="0" lang="ru-RU" sz="4400" spc="-1" strike="noStrike">
               <a:latin typeface="Arial"/>
             </a:endParaRPr>
           </a:p>
@@ -2432,7 +2432,7 @@
             <a:normAutofit/>
           </a:bodyPr>
           <a:p>
-            <a:endParaRPr b="0" lang="en-US" sz="3200" spc="-1" strike="noStrike">
+            <a:endParaRPr b="0" lang="ru-RU" sz="3200" spc="-1" strike="noStrike">
               <a:latin typeface="Arial"/>
             </a:endParaRPr>
           </a:p>
@@ -2485,7 +2485,7 @@
           </a:bodyPr>
           <a:p>
             <a:pPr algn="ctr"/>
-            <a:endParaRPr b="0" lang="en-US" sz="3200" spc="-1" strike="noStrike">
+            <a:endParaRPr b="0" lang="ru-RU" sz="3200" spc="-1" strike="noStrike">
               <a:latin typeface="Arial"/>
             </a:endParaRPr>
           </a:p>
@@ -2538,7 +2538,7 @@
           </a:bodyPr>
           <a:p>
             <a:pPr algn="ctr"/>
-            <a:endParaRPr b="0" lang="en-US" sz="4400" spc="-1" strike="noStrike">
+            <a:endParaRPr b="0" lang="ru-RU" sz="4400" spc="-1" strike="noStrike">
               <a:latin typeface="Arial"/>
             </a:endParaRPr>
           </a:p>
@@ -2568,7 +2568,7 @@
             <a:normAutofit/>
           </a:bodyPr>
           <a:p>
-            <a:endParaRPr b="0" lang="en-US" sz="3200" spc="-1" strike="noStrike">
+            <a:endParaRPr b="0" lang="ru-RU" sz="3200" spc="-1" strike="noStrike">
               <a:latin typeface="Arial"/>
             </a:endParaRPr>
           </a:p>
@@ -2598,7 +2598,7 @@
             <a:normAutofit/>
           </a:bodyPr>
           <a:p>
-            <a:endParaRPr b="0" lang="en-US" sz="3200" spc="-1" strike="noStrike">
+            <a:endParaRPr b="0" lang="ru-RU" sz="3200" spc="-1" strike="noStrike">
               <a:latin typeface="Arial"/>
             </a:endParaRPr>
           </a:p>
@@ -2628,7 +2628,7 @@
             <a:normAutofit/>
           </a:bodyPr>
           <a:p>
-            <a:endParaRPr b="0" lang="en-US" sz="3200" spc="-1" strike="noStrike">
+            <a:endParaRPr b="0" lang="ru-RU" sz="3200" spc="-1" strike="noStrike">
               <a:latin typeface="Arial"/>
             </a:endParaRPr>
           </a:p>
@@ -2681,7 +2681,7 @@
           </a:bodyPr>
           <a:p>
             <a:pPr algn="ctr"/>
-            <a:endParaRPr b="0" lang="en-US" sz="4400" spc="-1" strike="noStrike">
+            <a:endParaRPr b="0" lang="ru-RU" sz="4400" spc="-1" strike="noStrike">
               <a:latin typeface="Arial"/>
             </a:endParaRPr>
           </a:p>
@@ -2711,7 +2711,7 @@
             <a:normAutofit/>
           </a:bodyPr>
           <a:p>
-            <a:endParaRPr b="0" lang="en-US" sz="3200" spc="-1" strike="noStrike">
+            <a:endParaRPr b="0" lang="ru-RU" sz="3200" spc="-1" strike="noStrike">
               <a:latin typeface="Arial"/>
             </a:endParaRPr>
           </a:p>
@@ -2741,7 +2741,7 @@
             <a:normAutofit/>
           </a:bodyPr>
           <a:p>
-            <a:endParaRPr b="0" lang="en-US" sz="3200" spc="-1" strike="noStrike">
+            <a:endParaRPr b="0" lang="ru-RU" sz="3200" spc="-1" strike="noStrike">
               <a:latin typeface="Arial"/>
             </a:endParaRPr>
           </a:p>
@@ -2771,7 +2771,7 @@
             <a:normAutofit/>
           </a:bodyPr>
           <a:p>
-            <a:endParaRPr b="0" lang="en-US" sz="3200" spc="-1" strike="noStrike">
+            <a:endParaRPr b="0" lang="ru-RU" sz="3200" spc="-1" strike="noStrike">
               <a:latin typeface="Arial"/>
             </a:endParaRPr>
           </a:p>
@@ -2824,7 +2824,7 @@
           </a:bodyPr>
           <a:p>
             <a:pPr algn="ctr"/>
-            <a:endParaRPr b="0" lang="en-US" sz="4400" spc="-1" strike="noStrike">
+            <a:endParaRPr b="0" lang="ru-RU" sz="4400" spc="-1" strike="noStrike">
               <a:latin typeface="Arial"/>
             </a:endParaRPr>
           </a:p>
@@ -2854,7 +2854,7 @@
             <a:normAutofit/>
           </a:bodyPr>
           <a:p>
-            <a:endParaRPr b="0" lang="en-US" sz="3200" spc="-1" strike="noStrike">
+            <a:endParaRPr b="0" lang="ru-RU" sz="3200" spc="-1" strike="noStrike">
               <a:latin typeface="Arial"/>
             </a:endParaRPr>
           </a:p>
@@ -2884,7 +2884,7 @@
             <a:normAutofit/>
           </a:bodyPr>
           <a:p>
-            <a:endParaRPr b="0" lang="en-US" sz="3200" spc="-1" strike="noStrike">
+            <a:endParaRPr b="0" lang="ru-RU" sz="3200" spc="-1" strike="noStrike">
               <a:latin typeface="Arial"/>
             </a:endParaRPr>
           </a:p>
@@ -2914,7 +2914,7 @@
             <a:normAutofit/>
           </a:bodyPr>
           <a:p>
-            <a:endParaRPr b="0" lang="en-US" sz="3200" spc="-1" strike="noStrike">
+            <a:endParaRPr b="0" lang="ru-RU" sz="3200" spc="-1" strike="noStrike">
               <a:latin typeface="Arial"/>
             </a:endParaRPr>
           </a:p>
@@ -2967,7 +2967,7 @@
           </a:bodyPr>
           <a:p>
             <a:pPr algn="ctr"/>
-            <a:endParaRPr b="0" lang="en-US" sz="4400" spc="-1" strike="noStrike">
+            <a:endParaRPr b="0" lang="ru-RU" sz="4400" spc="-1" strike="noStrike">
               <a:latin typeface="Arial"/>
             </a:endParaRPr>
           </a:p>
@@ -2997,7 +2997,7 @@
             <a:normAutofit/>
           </a:bodyPr>
           <a:p>
-            <a:endParaRPr b="0" lang="en-US" sz="3200" spc="-1" strike="noStrike">
+            <a:endParaRPr b="0" lang="ru-RU" sz="3200" spc="-1" strike="noStrike">
               <a:latin typeface="Arial"/>
             </a:endParaRPr>
           </a:p>
@@ -3027,7 +3027,7 @@
             <a:normAutofit/>
           </a:bodyPr>
           <a:p>
-            <a:endParaRPr b="0" lang="en-US" sz="3200" spc="-1" strike="noStrike">
+            <a:endParaRPr b="0" lang="ru-RU" sz="3200" spc="-1" strike="noStrike">
               <a:latin typeface="Arial"/>
             </a:endParaRPr>
           </a:p>
@@ -3080,7 +3080,7 @@
           </a:bodyPr>
           <a:p>
             <a:pPr algn="ctr"/>
-            <a:endParaRPr b="0" lang="en-US" sz="4400" spc="-1" strike="noStrike">
+            <a:endParaRPr b="0" lang="ru-RU" sz="4400" spc="-1" strike="noStrike">
               <a:latin typeface="Arial"/>
             </a:endParaRPr>
           </a:p>
@@ -3110,7 +3110,7 @@
             <a:normAutofit/>
           </a:bodyPr>
           <a:p>
-            <a:endParaRPr b="0" lang="en-US" sz="3200" spc="-1" strike="noStrike">
+            <a:endParaRPr b="0" lang="ru-RU" sz="3200" spc="-1" strike="noStrike">
               <a:latin typeface="Arial"/>
             </a:endParaRPr>
           </a:p>
@@ -3140,7 +3140,7 @@
             <a:normAutofit/>
           </a:bodyPr>
           <a:p>
-            <a:endParaRPr b="0" lang="en-US" sz="3200" spc="-1" strike="noStrike">
+            <a:endParaRPr b="0" lang="ru-RU" sz="3200" spc="-1" strike="noStrike">
               <a:latin typeface="Arial"/>
             </a:endParaRPr>
           </a:p>
@@ -3170,7 +3170,7 @@
             <a:normAutofit/>
           </a:bodyPr>
           <a:p>
-            <a:endParaRPr b="0" lang="en-US" sz="3200" spc="-1" strike="noStrike">
+            <a:endParaRPr b="0" lang="ru-RU" sz="3200" spc="-1" strike="noStrike">
               <a:latin typeface="Arial"/>
             </a:endParaRPr>
           </a:p>
@@ -3200,7 +3200,7 @@
             <a:normAutofit/>
           </a:bodyPr>
           <a:p>
-            <a:endParaRPr b="0" lang="en-US" sz="3200" spc="-1" strike="noStrike">
+            <a:endParaRPr b="0" lang="ru-RU" sz="3200" spc="-1" strike="noStrike">
               <a:latin typeface="Arial"/>
             </a:endParaRPr>
           </a:p>
@@ -3253,7 +3253,7 @@
           </a:bodyPr>
           <a:p>
             <a:pPr algn="ctr"/>
-            <a:endParaRPr b="0" lang="en-US" sz="4400" spc="-1" strike="noStrike">
+            <a:endParaRPr b="0" lang="ru-RU" sz="4400" spc="-1" strike="noStrike">
               <a:latin typeface="Arial"/>
             </a:endParaRPr>
           </a:p>
@@ -3283,7 +3283,7 @@
             <a:normAutofit/>
           </a:bodyPr>
           <a:p>
-            <a:endParaRPr b="0" lang="en-US" sz="3200" spc="-1" strike="noStrike">
+            <a:endParaRPr b="0" lang="ru-RU" sz="3200" spc="-1" strike="noStrike">
               <a:latin typeface="Arial"/>
             </a:endParaRPr>
           </a:p>
@@ -3313,7 +3313,7 @@
             <a:normAutofit/>
           </a:bodyPr>
           <a:p>
-            <a:endParaRPr b="0" lang="en-US" sz="3200" spc="-1" strike="noStrike">
+            <a:endParaRPr b="0" lang="ru-RU" sz="3200" spc="-1" strike="noStrike">
               <a:latin typeface="Arial"/>
             </a:endParaRPr>
           </a:p>
@@ -3343,7 +3343,7 @@
             <a:normAutofit/>
           </a:bodyPr>
           <a:p>
-            <a:endParaRPr b="0" lang="en-US" sz="3200" spc="-1" strike="noStrike">
+            <a:endParaRPr b="0" lang="ru-RU" sz="3200" spc="-1" strike="noStrike">
               <a:latin typeface="Arial"/>
             </a:endParaRPr>
           </a:p>
@@ -3373,7 +3373,7 @@
             <a:normAutofit/>
           </a:bodyPr>
           <a:p>
-            <a:endParaRPr b="0" lang="en-US" sz="3200" spc="-1" strike="noStrike">
+            <a:endParaRPr b="0" lang="ru-RU" sz="3200" spc="-1" strike="noStrike">
               <a:latin typeface="Arial"/>
             </a:endParaRPr>
           </a:p>
@@ -3403,7 +3403,7 @@
             <a:normAutofit/>
           </a:bodyPr>
           <a:p>
-            <a:endParaRPr b="0" lang="en-US" sz="3200" spc="-1" strike="noStrike">
+            <a:endParaRPr b="0" lang="ru-RU" sz="3200" spc="-1" strike="noStrike">
               <a:latin typeface="Arial"/>
             </a:endParaRPr>
           </a:p>
@@ -3433,7 +3433,7 @@
             <a:normAutofit/>
           </a:bodyPr>
           <a:p>
-            <a:endParaRPr b="0" lang="en-US" sz="3200" spc="-1" strike="noStrike">
+            <a:endParaRPr b="0" lang="ru-RU" sz="3200" spc="-1" strike="noStrike">
               <a:latin typeface="Arial"/>
             </a:endParaRPr>
           </a:p>
@@ -3486,7 +3486,7 @@
           </a:bodyPr>
           <a:p>
             <a:pPr algn="ctr"/>
-            <a:endParaRPr b="0" lang="en-US" sz="4400" spc="-1" strike="noStrike">
+            <a:endParaRPr b="0" lang="ru-RU" sz="4400" spc="-1" strike="noStrike">
               <a:latin typeface="Arial"/>
             </a:endParaRPr>
           </a:p>
@@ -3516,7 +3516,7 @@
             <a:normAutofit/>
           </a:bodyPr>
           <a:p>
-            <a:endParaRPr b="0" lang="en-US" sz="3200" spc="-1" strike="noStrike">
+            <a:endParaRPr b="0" lang="ru-RU" sz="3200" spc="-1" strike="noStrike">
               <a:latin typeface="Arial"/>
             </a:endParaRPr>
           </a:p>
@@ -3546,7 +3546,7 @@
             <a:normAutofit/>
           </a:bodyPr>
           <a:p>
-            <a:endParaRPr b="0" lang="en-US" sz="3200" spc="-1" strike="noStrike">
+            <a:endParaRPr b="0" lang="ru-RU" sz="3200" spc="-1" strike="noStrike">
               <a:latin typeface="Arial"/>
             </a:endParaRPr>
           </a:p>
@@ -3599,7 +3599,7 @@
           </a:bodyPr>
           <a:p>
             <a:pPr algn="ctr"/>
-            <a:endParaRPr b="0" lang="en-US" sz="4400" spc="-1" strike="noStrike">
+            <a:endParaRPr b="0" lang="ru-RU" sz="4400" spc="-1" strike="noStrike">
               <a:latin typeface="Arial"/>
             </a:endParaRPr>
           </a:p>
@@ -3652,7 +3652,7 @@
           </a:bodyPr>
           <a:p>
             <a:pPr algn="ctr"/>
-            <a:endParaRPr b="0" lang="en-US" sz="3200" spc="-1" strike="noStrike">
+            <a:endParaRPr b="0" lang="ru-RU" sz="3200" spc="-1" strike="noStrike">
               <a:latin typeface="Arial"/>
             </a:endParaRPr>
           </a:p>
@@ -3705,7 +3705,7 @@
           </a:bodyPr>
           <a:p>
             <a:pPr algn="ctr"/>
-            <a:endParaRPr b="0" lang="en-US" sz="4400" spc="-1" strike="noStrike">
+            <a:endParaRPr b="0" lang="ru-RU" sz="4400" spc="-1" strike="noStrike">
               <a:latin typeface="Arial"/>
             </a:endParaRPr>
           </a:p>
@@ -3735,7 +3735,7 @@
             <a:normAutofit/>
           </a:bodyPr>
           <a:p>
-            <a:endParaRPr b="0" lang="en-US" sz="3200" spc="-1" strike="noStrike">
+            <a:endParaRPr b="0" lang="ru-RU" sz="3200" spc="-1" strike="noStrike">
               <a:latin typeface="Arial"/>
             </a:endParaRPr>
           </a:p>
@@ -3765,7 +3765,7 @@
             <a:normAutofit/>
           </a:bodyPr>
           <a:p>
-            <a:endParaRPr b="0" lang="en-US" sz="3200" spc="-1" strike="noStrike">
+            <a:endParaRPr b="0" lang="ru-RU" sz="3200" spc="-1" strike="noStrike">
               <a:latin typeface="Arial"/>
             </a:endParaRPr>
           </a:p>
@@ -3795,7 +3795,7 @@
             <a:normAutofit/>
           </a:bodyPr>
           <a:p>
-            <a:endParaRPr b="0" lang="en-US" sz="3200" spc="-1" strike="noStrike">
+            <a:endParaRPr b="0" lang="ru-RU" sz="3200" spc="-1" strike="noStrike">
               <a:latin typeface="Arial"/>
             </a:endParaRPr>
           </a:p>
@@ -3848,7 +3848,7 @@
           </a:bodyPr>
           <a:p>
             <a:pPr algn="ctr"/>
-            <a:endParaRPr b="0" lang="en-US" sz="4400" spc="-1" strike="noStrike">
+            <a:endParaRPr b="0" lang="ru-RU" sz="4400" spc="-1" strike="noStrike">
               <a:latin typeface="Arial"/>
             </a:endParaRPr>
           </a:p>
@@ -3878,7 +3878,7 @@
             <a:normAutofit/>
           </a:bodyPr>
           <a:p>
-            <a:endParaRPr b="0" lang="en-US" sz="3200" spc="-1" strike="noStrike">
+            <a:endParaRPr b="0" lang="ru-RU" sz="3200" spc="-1" strike="noStrike">
               <a:latin typeface="Arial"/>
             </a:endParaRPr>
           </a:p>
@@ -3908,7 +3908,7 @@
             <a:normAutofit/>
           </a:bodyPr>
           <a:p>
-            <a:endParaRPr b="0" lang="en-US" sz="3200" spc="-1" strike="noStrike">
+            <a:endParaRPr b="0" lang="ru-RU" sz="3200" spc="-1" strike="noStrike">
               <a:latin typeface="Arial"/>
             </a:endParaRPr>
           </a:p>
@@ -3938,7 +3938,7 @@
             <a:normAutofit/>
           </a:bodyPr>
           <a:p>
-            <a:endParaRPr b="0" lang="en-US" sz="3200" spc="-1" strike="noStrike">
+            <a:endParaRPr b="0" lang="ru-RU" sz="3200" spc="-1" strike="noStrike">
               <a:latin typeface="Arial"/>
             </a:endParaRPr>
           </a:p>
@@ -3991,7 +3991,7 @@
           </a:bodyPr>
           <a:p>
             <a:pPr algn="ctr"/>
-            <a:endParaRPr b="0" lang="en-US" sz="4400" spc="-1" strike="noStrike">
+            <a:endParaRPr b="0" lang="ru-RU" sz="4400" spc="-1" strike="noStrike">
               <a:latin typeface="Arial"/>
             </a:endParaRPr>
           </a:p>
@@ -4021,7 +4021,7 @@
             <a:normAutofit/>
           </a:bodyPr>
           <a:p>
-            <a:endParaRPr b="0" lang="en-US" sz="3200" spc="-1" strike="noStrike">
+            <a:endParaRPr b="0" lang="ru-RU" sz="3200" spc="-1" strike="noStrike">
               <a:latin typeface="Arial"/>
             </a:endParaRPr>
           </a:p>
@@ -4051,7 +4051,7 @@
             <a:normAutofit/>
           </a:bodyPr>
           <a:p>
-            <a:endParaRPr b="0" lang="en-US" sz="3200" spc="-1" strike="noStrike">
+            <a:endParaRPr b="0" lang="ru-RU" sz="3200" spc="-1" strike="noStrike">
               <a:latin typeface="Arial"/>
             </a:endParaRPr>
           </a:p>
@@ -4081,7 +4081,7 @@
             <a:normAutofit/>
           </a:bodyPr>
           <a:p>
-            <a:endParaRPr b="0" lang="en-US" sz="3200" spc="-1" strike="noStrike">
+            <a:endParaRPr b="0" lang="ru-RU" sz="3200" spc="-1" strike="noStrike">
               <a:latin typeface="Arial"/>
             </a:endParaRPr>
           </a:p>
@@ -4145,12 +4145,12 @@
           <a:p>
             <a:pPr algn="ctr"/>
             <a:r>
-              <a:rPr b="0" lang="en-US" sz="4400" spc="-1" strike="noStrike">
+              <a:rPr b="0" lang="ru-RU" sz="4400" spc="-1" strike="noStrike">
                 <a:latin typeface="Arial"/>
               </a:rPr>
               <a:t>Click to edit the title text format</a:t>
             </a:r>
-            <a:endParaRPr b="0" lang="en-US" sz="4400" spc="-1" strike="noStrike">
+            <a:endParaRPr b="0" lang="ru-RU" sz="4400" spc="-1" strike="noStrike">
               <a:latin typeface="Arial"/>
             </a:endParaRPr>
           </a:p>
@@ -4192,12 +4192,12 @@
               <a:buChar char=""/>
             </a:pPr>
             <a:r>
-              <a:rPr b="0" lang="en-US" sz="3200" spc="-1" strike="noStrike">
+              <a:rPr b="0" lang="ru-RU" sz="3200" spc="-1" strike="noStrike">
                 <a:latin typeface="Arial"/>
               </a:rPr>
               <a:t>Click to edit the outline text format</a:t>
             </a:r>
-            <a:endParaRPr b="0" lang="en-US" sz="3200" spc="-1" strike="noStrike">
+            <a:endParaRPr b="0" lang="ru-RU" sz="3200" spc="-1" strike="noStrike">
               <a:latin typeface="Arial"/>
             </a:endParaRPr>
           </a:p>
@@ -4214,12 +4214,12 @@
               <a:buChar char=""/>
             </a:pPr>
             <a:r>
-              <a:rPr b="0" lang="en-US" sz="2800" spc="-1" strike="noStrike">
+              <a:rPr b="0" lang="ru-RU" sz="2800" spc="-1" strike="noStrike">
                 <a:latin typeface="Arial"/>
               </a:rPr>
               <a:t>Second Outline Level</a:t>
             </a:r>
-            <a:endParaRPr b="0" lang="en-US" sz="2800" spc="-1" strike="noStrike">
+            <a:endParaRPr b="0" lang="ru-RU" sz="2800" spc="-1" strike="noStrike">
               <a:latin typeface="Arial"/>
             </a:endParaRPr>
           </a:p>
@@ -4236,12 +4236,12 @@
               <a:buChar char=""/>
             </a:pPr>
             <a:r>
-              <a:rPr b="0" lang="en-US" sz="2400" spc="-1" strike="noStrike">
+              <a:rPr b="0" lang="ru-RU" sz="2400" spc="-1" strike="noStrike">
                 <a:latin typeface="Arial"/>
               </a:rPr>
               <a:t>Third Outline Level</a:t>
             </a:r>
-            <a:endParaRPr b="0" lang="en-US" sz="2400" spc="-1" strike="noStrike">
+            <a:endParaRPr b="0" lang="ru-RU" sz="2400" spc="-1" strike="noStrike">
               <a:latin typeface="Arial"/>
             </a:endParaRPr>
           </a:p>
@@ -4258,12 +4258,12 @@
               <a:buChar char=""/>
             </a:pPr>
             <a:r>
-              <a:rPr b="0" lang="en-US" sz="2000" spc="-1" strike="noStrike">
+              <a:rPr b="0" lang="ru-RU" sz="2000" spc="-1" strike="noStrike">
                 <a:latin typeface="Arial"/>
               </a:rPr>
               <a:t>Fourth Outline Level</a:t>
             </a:r>
-            <a:endParaRPr b="0" lang="en-US" sz="2000" spc="-1" strike="noStrike">
+            <a:endParaRPr b="0" lang="ru-RU" sz="2000" spc="-1" strike="noStrike">
               <a:latin typeface="Arial"/>
             </a:endParaRPr>
           </a:p>
@@ -4280,12 +4280,12 @@
               <a:buChar char=""/>
             </a:pPr>
             <a:r>
-              <a:rPr b="0" lang="en-US" sz="2000" spc="-1" strike="noStrike">
+              <a:rPr b="0" lang="ru-RU" sz="2000" spc="-1" strike="noStrike">
                 <a:latin typeface="Arial"/>
               </a:rPr>
               <a:t>Fifth Outline Level</a:t>
             </a:r>
-            <a:endParaRPr b="0" lang="en-US" sz="2000" spc="-1" strike="noStrike">
+            <a:endParaRPr b="0" lang="ru-RU" sz="2000" spc="-1" strike="noStrike">
               <a:latin typeface="Arial"/>
             </a:endParaRPr>
           </a:p>
@@ -4302,12 +4302,12 @@
               <a:buChar char=""/>
             </a:pPr>
             <a:r>
-              <a:rPr b="0" lang="en-US" sz="2000" spc="-1" strike="noStrike">
+              <a:rPr b="0" lang="ru-RU" sz="2000" spc="-1" strike="noStrike">
                 <a:latin typeface="Arial"/>
               </a:rPr>
               <a:t>Sixth Outline Level</a:t>
             </a:r>
-            <a:endParaRPr b="0" lang="en-US" sz="2000" spc="-1" strike="noStrike">
+            <a:endParaRPr b="0" lang="ru-RU" sz="2000" spc="-1" strike="noStrike">
               <a:latin typeface="Arial"/>
             </a:endParaRPr>
           </a:p>
@@ -4324,12 +4324,12 @@
               <a:buChar char=""/>
             </a:pPr>
             <a:r>
-              <a:rPr b="0" lang="en-US" sz="2000" spc="-1" strike="noStrike">
+              <a:rPr b="0" lang="ru-RU" sz="2000" spc="-1" strike="noStrike">
                 <a:latin typeface="Arial"/>
               </a:rPr>
               <a:t>Seventh Outline Level</a:t>
             </a:r>
-            <a:endParaRPr b="0" lang="en-US" sz="2000" spc="-1" strike="noStrike">
+            <a:endParaRPr b="0" lang="ru-RU" sz="2000" spc="-1" strike="noStrike">
               <a:latin typeface="Arial"/>
             </a:endParaRPr>
           </a:p>
@@ -4408,12 +4408,12 @@
           <a:p>
             <a:pPr algn="ctr"/>
             <a:r>
-              <a:rPr b="0" lang="en-US" sz="4400" spc="-1" strike="noStrike">
+              <a:rPr b="0" lang="ru-RU" sz="4400" spc="-1" strike="noStrike">
                 <a:latin typeface="Arial"/>
               </a:rPr>
               <a:t>Click to edit the title text format</a:t>
             </a:r>
-            <a:endParaRPr b="0" lang="en-US" sz="4400" spc="-1" strike="noStrike">
+            <a:endParaRPr b="0" lang="ru-RU" sz="4400" spc="-1" strike="noStrike">
               <a:latin typeface="Arial"/>
             </a:endParaRPr>
           </a:p>
@@ -4455,12 +4455,12 @@
               <a:buChar char=""/>
             </a:pPr>
             <a:r>
-              <a:rPr b="0" lang="en-US" sz="3200" spc="-1" strike="noStrike">
+              <a:rPr b="0" lang="ru-RU" sz="3200" spc="-1" strike="noStrike">
                 <a:latin typeface="Arial"/>
               </a:rPr>
               <a:t>Click to edit the outline text format</a:t>
             </a:r>
-            <a:endParaRPr b="0" lang="en-US" sz="3200" spc="-1" strike="noStrike">
+            <a:endParaRPr b="0" lang="ru-RU" sz="3200" spc="-1" strike="noStrike">
               <a:latin typeface="Arial"/>
             </a:endParaRPr>
           </a:p>
@@ -4477,12 +4477,12 @@
               <a:buChar char=""/>
             </a:pPr>
             <a:r>
-              <a:rPr b="0" lang="en-US" sz="2800" spc="-1" strike="noStrike">
+              <a:rPr b="0" lang="ru-RU" sz="2800" spc="-1" strike="noStrike">
                 <a:latin typeface="Arial"/>
               </a:rPr>
               <a:t>Second Outline Level</a:t>
             </a:r>
-            <a:endParaRPr b="0" lang="en-US" sz="2800" spc="-1" strike="noStrike">
+            <a:endParaRPr b="0" lang="ru-RU" sz="2800" spc="-1" strike="noStrike">
               <a:latin typeface="Arial"/>
             </a:endParaRPr>
           </a:p>
@@ -4499,12 +4499,12 @@
               <a:buChar char=""/>
             </a:pPr>
             <a:r>
-              <a:rPr b="0" lang="en-US" sz="2400" spc="-1" strike="noStrike">
+              <a:rPr b="0" lang="ru-RU" sz="2400" spc="-1" strike="noStrike">
                 <a:latin typeface="Arial"/>
               </a:rPr>
               <a:t>Third Outline Level</a:t>
             </a:r>
-            <a:endParaRPr b="0" lang="en-US" sz="2400" spc="-1" strike="noStrike">
+            <a:endParaRPr b="0" lang="ru-RU" sz="2400" spc="-1" strike="noStrike">
               <a:latin typeface="Arial"/>
             </a:endParaRPr>
           </a:p>
@@ -4521,12 +4521,12 @@
               <a:buChar char=""/>
             </a:pPr>
             <a:r>
-              <a:rPr b="0" lang="en-US" sz="2000" spc="-1" strike="noStrike">
+              <a:rPr b="0" lang="ru-RU" sz="2000" spc="-1" strike="noStrike">
                 <a:latin typeface="Arial"/>
               </a:rPr>
               <a:t>Fourth Outline Level</a:t>
             </a:r>
-            <a:endParaRPr b="0" lang="en-US" sz="2000" spc="-1" strike="noStrike">
+            <a:endParaRPr b="0" lang="ru-RU" sz="2000" spc="-1" strike="noStrike">
               <a:latin typeface="Arial"/>
             </a:endParaRPr>
           </a:p>
@@ -4543,12 +4543,12 @@
               <a:buChar char=""/>
             </a:pPr>
             <a:r>
-              <a:rPr b="0" lang="en-US" sz="2000" spc="-1" strike="noStrike">
+              <a:rPr b="0" lang="ru-RU" sz="2000" spc="-1" strike="noStrike">
                 <a:latin typeface="Arial"/>
               </a:rPr>
               <a:t>Fifth Outline Level</a:t>
             </a:r>
-            <a:endParaRPr b="0" lang="en-US" sz="2000" spc="-1" strike="noStrike">
+            <a:endParaRPr b="0" lang="ru-RU" sz="2000" spc="-1" strike="noStrike">
               <a:latin typeface="Arial"/>
             </a:endParaRPr>
           </a:p>
@@ -4565,12 +4565,12 @@
               <a:buChar char=""/>
             </a:pPr>
             <a:r>
-              <a:rPr b="0" lang="en-US" sz="2000" spc="-1" strike="noStrike">
+              <a:rPr b="0" lang="ru-RU" sz="2000" spc="-1" strike="noStrike">
                 <a:latin typeface="Arial"/>
               </a:rPr>
               <a:t>Sixth Outline Level</a:t>
             </a:r>
-            <a:endParaRPr b="0" lang="en-US" sz="2000" spc="-1" strike="noStrike">
+            <a:endParaRPr b="0" lang="ru-RU" sz="2000" spc="-1" strike="noStrike">
               <a:latin typeface="Arial"/>
             </a:endParaRPr>
           </a:p>
@@ -4587,12 +4587,12 @@
               <a:buChar char=""/>
             </a:pPr>
             <a:r>
-              <a:rPr b="0" lang="en-US" sz="2000" spc="-1" strike="noStrike">
+              <a:rPr b="0" lang="ru-RU" sz="2000" spc="-1" strike="noStrike">
                 <a:latin typeface="Arial"/>
               </a:rPr>
               <a:t>Seventh Outline Level</a:t>
             </a:r>
-            <a:endParaRPr b="0" lang="en-US" sz="2000" spc="-1" strike="noStrike">
+            <a:endParaRPr b="0" lang="ru-RU" sz="2000" spc="-1" strike="noStrike">
               <a:latin typeface="Arial"/>
             </a:endParaRPr>
           </a:p>
@@ -4671,12 +4671,12 @@
           <a:p>
             <a:pPr algn="ctr"/>
             <a:r>
-              <a:rPr b="0" lang="en-US" sz="4400" spc="-1" strike="noStrike">
+              <a:rPr b="0" lang="ru-RU" sz="4400" spc="-1" strike="noStrike">
                 <a:latin typeface="Arial"/>
               </a:rPr>
               <a:t>Click to edit the title text format</a:t>
             </a:r>
-            <a:endParaRPr b="0" lang="en-US" sz="4400" spc="-1" strike="noStrike">
+            <a:endParaRPr b="0" lang="ru-RU" sz="4400" spc="-1" strike="noStrike">
               <a:latin typeface="Arial"/>
             </a:endParaRPr>
           </a:p>
@@ -4718,12 +4718,12 @@
               <a:buChar char=""/>
             </a:pPr>
             <a:r>
-              <a:rPr b="0" lang="en-US" sz="3200" spc="-1" strike="noStrike">
+              <a:rPr b="0" lang="ru-RU" sz="3200" spc="-1" strike="noStrike">
                 <a:latin typeface="Arial"/>
               </a:rPr>
               <a:t>Click to edit the outline text format</a:t>
             </a:r>
-            <a:endParaRPr b="0" lang="en-US" sz="3200" spc="-1" strike="noStrike">
+            <a:endParaRPr b="0" lang="ru-RU" sz="3200" spc="-1" strike="noStrike">
               <a:latin typeface="Arial"/>
             </a:endParaRPr>
           </a:p>
@@ -4740,12 +4740,12 @@
               <a:buChar char=""/>
             </a:pPr>
             <a:r>
-              <a:rPr b="0" lang="en-US" sz="2800" spc="-1" strike="noStrike">
+              <a:rPr b="0" lang="ru-RU" sz="2800" spc="-1" strike="noStrike">
                 <a:latin typeface="Arial"/>
               </a:rPr>
               <a:t>Second Outline Level</a:t>
             </a:r>
-            <a:endParaRPr b="0" lang="en-US" sz="2800" spc="-1" strike="noStrike">
+            <a:endParaRPr b="0" lang="ru-RU" sz="2800" spc="-1" strike="noStrike">
               <a:latin typeface="Arial"/>
             </a:endParaRPr>
           </a:p>
@@ -4762,12 +4762,12 @@
               <a:buChar char=""/>
             </a:pPr>
             <a:r>
-              <a:rPr b="0" lang="en-US" sz="2400" spc="-1" strike="noStrike">
+              <a:rPr b="0" lang="ru-RU" sz="2400" spc="-1" strike="noStrike">
                 <a:latin typeface="Arial"/>
               </a:rPr>
               <a:t>Third Outline Level</a:t>
             </a:r>
-            <a:endParaRPr b="0" lang="en-US" sz="2400" spc="-1" strike="noStrike">
+            <a:endParaRPr b="0" lang="ru-RU" sz="2400" spc="-1" strike="noStrike">
               <a:latin typeface="Arial"/>
             </a:endParaRPr>
           </a:p>
@@ -4784,12 +4784,12 @@
               <a:buChar char=""/>
             </a:pPr>
             <a:r>
-              <a:rPr b="0" lang="en-US" sz="2000" spc="-1" strike="noStrike">
+              <a:rPr b="0" lang="ru-RU" sz="2000" spc="-1" strike="noStrike">
                 <a:latin typeface="Arial"/>
               </a:rPr>
               <a:t>Fourth Outline Level</a:t>
             </a:r>
-            <a:endParaRPr b="0" lang="en-US" sz="2000" spc="-1" strike="noStrike">
+            <a:endParaRPr b="0" lang="ru-RU" sz="2000" spc="-1" strike="noStrike">
               <a:latin typeface="Arial"/>
             </a:endParaRPr>
           </a:p>
@@ -4806,12 +4806,12 @@
               <a:buChar char=""/>
             </a:pPr>
             <a:r>
-              <a:rPr b="0" lang="en-US" sz="2000" spc="-1" strike="noStrike">
+              <a:rPr b="0" lang="ru-RU" sz="2000" spc="-1" strike="noStrike">
                 <a:latin typeface="Arial"/>
               </a:rPr>
               <a:t>Fifth Outline Level</a:t>
             </a:r>
-            <a:endParaRPr b="0" lang="en-US" sz="2000" spc="-1" strike="noStrike">
+            <a:endParaRPr b="0" lang="ru-RU" sz="2000" spc="-1" strike="noStrike">
               <a:latin typeface="Arial"/>
             </a:endParaRPr>
           </a:p>
@@ -4828,12 +4828,12 @@
               <a:buChar char=""/>
             </a:pPr>
             <a:r>
-              <a:rPr b="0" lang="en-US" sz="2000" spc="-1" strike="noStrike">
+              <a:rPr b="0" lang="ru-RU" sz="2000" spc="-1" strike="noStrike">
                 <a:latin typeface="Arial"/>
               </a:rPr>
               <a:t>Sixth Outline Level</a:t>
             </a:r>
-            <a:endParaRPr b="0" lang="en-US" sz="2000" spc="-1" strike="noStrike">
+            <a:endParaRPr b="0" lang="ru-RU" sz="2000" spc="-1" strike="noStrike">
               <a:latin typeface="Arial"/>
             </a:endParaRPr>
           </a:p>
@@ -4850,12 +4850,12 @@
               <a:buChar char=""/>
             </a:pPr>
             <a:r>
-              <a:rPr b="0" lang="en-US" sz="2000" spc="-1" strike="noStrike">
+              <a:rPr b="0" lang="ru-RU" sz="2000" spc="-1" strike="noStrike">
                 <a:latin typeface="Arial"/>
               </a:rPr>
               <a:t>Seventh Outline Level</a:t>
             </a:r>
-            <a:endParaRPr b="0" lang="en-US" sz="2000" spc="-1" strike="noStrike">
+            <a:endParaRPr b="0" lang="ru-RU" sz="2000" spc="-1" strike="noStrike">
               <a:latin typeface="Arial"/>
             </a:endParaRPr>
           </a:p>
@@ -4907,7 +4907,7 @@
         <p:spPr>
           <a:xfrm>
             <a:off x="548640" y="301320"/>
-            <a:ext cx="10796040" cy="4451040"/>
+            <a:ext cx="10795680" cy="4450680"/>
           </a:xfrm>
           <a:prstGeom prst="rect">
             <a:avLst/>
@@ -4943,7 +4943,7 @@
               </a:rPr>
               <a:t>Инструментальные средства программирования</a:t>
             </a:r>
-            <a:endParaRPr b="0" lang="en-US" sz="8000" spc="-1" strike="noStrike">
+            <a:endParaRPr b="0" lang="ru-RU" sz="8000" spc="-1" strike="noStrike">
               <a:latin typeface="Arial"/>
             </a:endParaRPr>
           </a:p>
@@ -4958,7 +4958,7 @@
         <p:spPr>
           <a:xfrm>
             <a:off x="552960" y="5216400"/>
-            <a:ext cx="10787400" cy="1547640"/>
+            <a:ext cx="10787040" cy="1547280"/>
           </a:xfrm>
           <a:prstGeom prst="rect">
             <a:avLst/>
@@ -4994,7 +4994,7 @@
               </a:rPr>
               <a:t>Лекция 5. Azure DevOps</a:t>
             </a:r>
-            <a:endParaRPr b="0" lang="en-US" sz="3600" spc="-1" strike="noStrike">
+            <a:endParaRPr b="0" lang="ru-RU" sz="3600" spc="-1" strike="noStrike">
               <a:latin typeface="Arial"/>
             </a:endParaRPr>
           </a:p>
@@ -5014,7 +5014,7 @@
               </a:rPr>
               <a:t>Пешехонов К. А., 28.10.2020</a:t>
             </a:r>
-            <a:endParaRPr b="0" lang="en-US" sz="3600" spc="-1" strike="noStrike">
+            <a:endParaRPr b="0" lang="ru-RU" sz="3600" spc="-1" strike="noStrike">
               <a:latin typeface="Arial"/>
             </a:endParaRPr>
           </a:p>
@@ -5059,7 +5059,7 @@
         <p:spPr>
           <a:xfrm>
             <a:off x="599040" y="121320"/>
-            <a:ext cx="10796040" cy="1259640"/>
+            <a:ext cx="10795680" cy="1259280"/>
           </a:xfrm>
           <a:prstGeom prst="rect">
             <a:avLst/>
@@ -5077,7 +5077,7 @@
         </p:style>
         <p:txBody>
           <a:bodyPr lIns="0" rIns="0" tIns="0" bIns="0" anchor="b">
-            <a:normAutofit fontScale="57000"/>
+            <a:normAutofit/>
           </a:bodyPr>
           <a:p>
             <a:pPr>
@@ -5095,7 +5095,7 @@
               </a:rPr>
               <a:t>Azure DevOps — лаб. работа #2</a:t>
             </a:r>
-            <a:endParaRPr b="0" lang="en-US" sz="6000" spc="-1" strike="noStrike">
+            <a:endParaRPr b="0" lang="ru-RU" sz="6000" spc="-1" strike="noStrike">
               <a:latin typeface="Arial"/>
             </a:endParaRPr>
           </a:p>
@@ -5110,7 +5110,7 @@
         <p:spPr>
           <a:xfrm>
             <a:off x="599040" y="1920240"/>
-            <a:ext cx="10737000" cy="4660920"/>
+            <a:ext cx="10736640" cy="4660560"/>
           </a:xfrm>
           <a:prstGeom prst="rect">
             <a:avLst/>
@@ -5128,10 +5128,10 @@
         </p:style>
         <p:txBody>
           <a:bodyPr lIns="0" rIns="0" tIns="0" bIns="0">
-            <a:normAutofit fontScale="81000"/>
-          </a:bodyPr>
-          <a:p>
-            <a:pPr marL="432000" indent="-321480">
+            <a:normAutofit fontScale="40000"/>
+          </a:bodyPr>
+          <a:p>
+            <a:pPr marL="432000" indent="-321120">
               <a:lnSpc>
                 <a:spcPct val="100000"/>
               </a:lnSpc>
@@ -5155,12 +5155,12 @@
               </a:rPr>
               <a:t>На основании лабораторной работы #1 (Docker) настроить сборку NuGet пакета из Database.EFCore</a:t>
             </a:r>
-            <a:endParaRPr b="0" lang="en-US" sz="3200" spc="-1" strike="noStrike">
-              <a:latin typeface="Arial"/>
-            </a:endParaRPr>
-          </a:p>
-          <a:p>
-            <a:pPr marL="432000" indent="-321480">
+            <a:endParaRPr b="0" lang="ru-RU" sz="3200" spc="-1" strike="noStrike">
+              <a:latin typeface="Arial"/>
+            </a:endParaRPr>
+          </a:p>
+          <a:p>
+            <a:pPr marL="432000" indent="-321120">
               <a:lnSpc>
                 <a:spcPct val="100000"/>
               </a:lnSpc>
@@ -5182,14 +5182,72 @@
                 <a:latin typeface="Source Sans Pro"/>
                 <a:ea typeface="DejaVu Sans"/>
               </a:rPr>
-              <a:t>Подключить получившийся пакет в WebApplication.EFCore (прямую ссылку убрать, можно разделить на два солюшена)</a:t>
-            </a:r>
-            <a:endParaRPr b="0" lang="en-US" sz="3200" spc="-1" strike="noStrike">
-              <a:latin typeface="Arial"/>
-            </a:endParaRPr>
-          </a:p>
-          <a:p>
-            <a:pPr marL="432000" indent="-321480">
+              <a:t>Сборка должна выполняться в два этапа:</a:t>
+            </a:r>
+            <a:endParaRPr b="0" lang="ru-RU" sz="3200" spc="-1" strike="noStrike">
+              <a:latin typeface="Arial"/>
+            </a:endParaRPr>
+          </a:p>
+          <a:p>
+            <a:pPr lvl="2" marL="648000" indent="-216000">
+              <a:lnSpc>
+                <a:spcPct val="100000"/>
+              </a:lnSpc>
+              <a:spcAft>
+                <a:spcPts val="1409"/>
+              </a:spcAft>
+              <a:buClr>
+                <a:srgbClr val="000000"/>
+              </a:buClr>
+              <a:buSzPct val="45000"/>
+              <a:buFont typeface="Wingdings" charset="2"/>
+              <a:buChar char=""/>
+            </a:pPr>
+            <a:r>
+              <a:rPr b="0" lang="ru-RU" sz="3200" spc="-1" strike="noStrike">
+                <a:solidFill>
+                  <a:srgbClr val="000000"/>
+                </a:solidFill>
+                <a:latin typeface="Source Sans Pro"/>
+                <a:ea typeface="DejaVu Sans"/>
+              </a:rPr>
+              <a:t>Сборка NuGet пакета средствами Azure DevOps Build Pipeline</a:t>
+            </a:r>
+            <a:endParaRPr b="0" lang="ru-RU" sz="3200" spc="-1" strike="noStrike">
+              <a:latin typeface="Arial"/>
+            </a:endParaRPr>
+          </a:p>
+          <a:p>
+            <a:pPr lvl="2" marL="648000" indent="-216000">
+              <a:lnSpc>
+                <a:spcPct val="100000"/>
+              </a:lnSpc>
+              <a:spcAft>
+                <a:spcPts val="1409"/>
+              </a:spcAft>
+              <a:buClr>
+                <a:srgbClr val="000000"/>
+              </a:buClr>
+              <a:buSzPct val="45000"/>
+              <a:buFont typeface="Wingdings" charset="2"/>
+              <a:buChar char=""/>
+            </a:pPr>
+            <a:r>
+              <a:rPr b="0" lang="ru-RU" sz="3200" spc="-1" strike="noStrike">
+                <a:solidFill>
+                  <a:srgbClr val="000000"/>
+                </a:solidFill>
+                <a:latin typeface="Source Sans Pro"/>
+                <a:ea typeface="DejaVu Sans"/>
+              </a:rPr>
+              <a:t>Публикация готового пакета в Feed средствами Azure DevOps Release Pipeline</a:t>
+            </a:r>
+            <a:endParaRPr b="0" lang="ru-RU" sz="3200" spc="-1" strike="noStrike">
+              <a:latin typeface="Arial"/>
+            </a:endParaRPr>
+          </a:p>
+          <a:p>
+            <a:pPr marL="432000" indent="-321120">
               <a:lnSpc>
                 <a:spcPct val="100000"/>
               </a:lnSpc>
@@ -5211,14 +5269,14 @@
                 <a:latin typeface="Source Sans Pro"/>
                 <a:ea typeface="DejaVu Sans"/>
               </a:rPr>
-              <a:t>Приложение по-прежнему должно собираться в Docker </a:t>
-            </a:r>
-            <a:endParaRPr b="0" lang="en-US" sz="3200" spc="-1" strike="noStrike">
-              <a:latin typeface="Arial"/>
-            </a:endParaRPr>
-          </a:p>
-          <a:p>
-            <a:pPr marL="432000" indent="-321480">
+              <a:t>Подключить получившийся пакет в WebApplication.EFCore (прямую ссылку убрать, можно разделить на два солюшена)</a:t>
+            </a:r>
+            <a:endParaRPr b="0" lang="ru-RU" sz="3200" spc="-1" strike="noStrike">
+              <a:latin typeface="Arial"/>
+            </a:endParaRPr>
+          </a:p>
+          <a:p>
+            <a:pPr marL="432000" indent="-321120">
               <a:lnSpc>
                 <a:spcPct val="100000"/>
               </a:lnSpc>
@@ -5240,9 +5298,38 @@
                 <a:latin typeface="Source Sans Pro"/>
                 <a:ea typeface="DejaVu Sans"/>
               </a:rPr>
+              <a:t>Приложение по-прежнему должно собираться в Docker </a:t>
+            </a:r>
+            <a:endParaRPr b="0" lang="ru-RU" sz="3200" spc="-1" strike="noStrike">
+              <a:latin typeface="Arial"/>
+            </a:endParaRPr>
+          </a:p>
+          <a:p>
+            <a:pPr marL="432000" indent="-321120">
+              <a:lnSpc>
+                <a:spcPct val="100000"/>
+              </a:lnSpc>
+              <a:spcAft>
+                <a:spcPts val="1409"/>
+              </a:spcAft>
+              <a:buClr>
+                <a:srgbClr val="04617b"/>
+              </a:buClr>
+              <a:buSzPct val="45000"/>
+              <a:buFont typeface="Wingdings" charset="2"/>
+              <a:buChar char=""/>
+            </a:pPr>
+            <a:r>
+              <a:rPr b="0" lang="ru-RU" sz="3200" spc="-1" strike="noStrike">
+                <a:solidFill>
+                  <a:srgbClr val="000000"/>
+                </a:solidFill>
+                <a:latin typeface="Source Sans Pro"/>
+                <a:ea typeface="DejaVu Sans"/>
+              </a:rPr>
               <a:t>О результатах пишите, пожалуйста, на kapeshekhonov@etu.ru</a:t>
             </a:r>
-            <a:endParaRPr b="0" lang="en-US" sz="3200" spc="-1" strike="noStrike">
+            <a:endParaRPr b="0" lang="ru-RU" sz="3200" spc="-1" strike="noStrike">
               <a:latin typeface="Arial"/>
             </a:endParaRPr>
           </a:p>
@@ -5287,7 +5374,7 @@
         <p:spPr>
           <a:xfrm>
             <a:off x="599040" y="841320"/>
-            <a:ext cx="10796040" cy="5849280"/>
+            <a:ext cx="10795680" cy="5848920"/>
           </a:xfrm>
           <a:prstGeom prst="rect">
             <a:avLst/>
@@ -5323,7 +5410,7 @@
               </a:rPr>
               <a:t>Спасибо за внимание</a:t>
             </a:r>
-            <a:endParaRPr b="0" lang="en-US" sz="4000" spc="-1" strike="noStrike">
+            <a:endParaRPr b="0" lang="ru-RU" sz="4000" spc="-1" strike="noStrike">
               <a:latin typeface="Arial"/>
             </a:endParaRPr>
           </a:p>
@@ -5368,7 +5455,7 @@
         <p:spPr>
           <a:xfrm>
             <a:off x="578160" y="34560"/>
-            <a:ext cx="10796400" cy="1260000"/>
+            <a:ext cx="10796040" cy="1259640"/>
           </a:xfrm>
           <a:prstGeom prst="rect">
             <a:avLst/>
@@ -5404,7 +5491,7 @@
               </a:rPr>
               <a:t>Системы управления версиями</a:t>
             </a:r>
-            <a:endParaRPr b="0" lang="en-US" sz="4400" spc="-1" strike="noStrike">
+            <a:endParaRPr b="0" lang="ru-RU" sz="4400" spc="-1" strike="noStrike">
               <a:latin typeface="Arial"/>
             </a:endParaRPr>
           </a:p>
@@ -5419,7 +5506,7 @@
         <p:spPr>
           <a:xfrm>
             <a:off x="578160" y="1368000"/>
-            <a:ext cx="6799680" cy="1942560"/>
+            <a:ext cx="6799320" cy="1942200"/>
           </a:xfrm>
           <a:prstGeom prst="rect">
             <a:avLst/>
@@ -5440,7 +5527,7 @@
             <a:noAutofit/>
           </a:bodyPr>
           <a:p>
-            <a:pPr marL="216000" indent="-214560">
+            <a:pPr marL="216000" indent="-214200">
               <a:lnSpc>
                 <a:spcPct val="100000"/>
               </a:lnSpc>
@@ -5467,12 +5554,12 @@
               </a:rPr>
               <a:t>CVS – 1984 год</a:t>
             </a:r>
-            <a:endParaRPr b="0" lang="en-US" sz="1500" spc="-1" strike="noStrike">
-              <a:latin typeface="Arial"/>
-            </a:endParaRPr>
-          </a:p>
-          <a:p>
-            <a:pPr marL="216000" indent="-214560">
+            <a:endParaRPr b="0" lang="ru-RU" sz="1500" spc="-1" strike="noStrike">
+              <a:latin typeface="Arial"/>
+            </a:endParaRPr>
+          </a:p>
+          <a:p>
+            <a:pPr marL="216000" indent="-214200">
               <a:lnSpc>
                 <a:spcPct val="100000"/>
               </a:lnSpc>
@@ -5499,12 +5586,12 @@
               </a:rPr>
               <a:t>SVN – 2004 год</a:t>
             </a:r>
-            <a:endParaRPr b="0" lang="en-US" sz="1500" spc="-1" strike="noStrike">
-              <a:latin typeface="Arial"/>
-            </a:endParaRPr>
-          </a:p>
-          <a:p>
-            <a:pPr marL="216000" indent="-214560">
+            <a:endParaRPr b="0" lang="ru-RU" sz="1500" spc="-1" strike="noStrike">
+              <a:latin typeface="Arial"/>
+            </a:endParaRPr>
+          </a:p>
+          <a:p>
+            <a:pPr marL="216000" indent="-214200">
               <a:lnSpc>
                 <a:spcPct val="100000"/>
               </a:lnSpc>
@@ -5531,12 +5618,12 @@
               </a:rPr>
               <a:t>Git – 2005 год</a:t>
             </a:r>
-            <a:endParaRPr b="0" lang="en-US" sz="1500" spc="-1" strike="noStrike">
-              <a:latin typeface="Arial"/>
-            </a:endParaRPr>
-          </a:p>
-          <a:p>
-            <a:pPr marL="216000" indent="-214560">
+            <a:endParaRPr b="0" lang="ru-RU" sz="1500" spc="-1" strike="noStrike">
+              <a:latin typeface="Arial"/>
+            </a:endParaRPr>
+          </a:p>
+          <a:p>
+            <a:pPr marL="216000" indent="-214200">
               <a:lnSpc>
                 <a:spcPct val="100000"/>
               </a:lnSpc>
@@ -5563,12 +5650,12 @@
               </a:rPr>
               <a:t>Mercurial (Hg) – 2005 год</a:t>
             </a:r>
-            <a:endParaRPr b="0" lang="en-US" sz="1500" spc="-1" strike="noStrike">
-              <a:latin typeface="Arial"/>
-            </a:endParaRPr>
-          </a:p>
-          <a:p>
-            <a:pPr marL="216000" indent="-214560">
+            <a:endParaRPr b="0" lang="ru-RU" sz="1500" spc="-1" strike="noStrike">
+              <a:latin typeface="Arial"/>
+            </a:endParaRPr>
+          </a:p>
+          <a:p>
+            <a:pPr marL="216000" indent="-214200">
               <a:lnSpc>
                 <a:spcPct val="100000"/>
               </a:lnSpc>
@@ -5595,12 +5682,12 @@
               </a:rPr>
               <a:t>BitBucket – web UI для Hg/Git</a:t>
             </a:r>
-            <a:endParaRPr b="0" lang="en-US" sz="1500" spc="-1" strike="noStrike">
-              <a:latin typeface="Arial"/>
-            </a:endParaRPr>
-          </a:p>
-          <a:p>
-            <a:pPr marL="216000" indent="-214560">
+            <a:endParaRPr b="0" lang="ru-RU" sz="1500" spc="-1" strike="noStrike">
+              <a:latin typeface="Arial"/>
+            </a:endParaRPr>
+          </a:p>
+          <a:p>
+            <a:pPr marL="216000" indent="-214200">
               <a:lnSpc>
                 <a:spcPct val="100000"/>
               </a:lnSpc>
@@ -5627,7 +5714,7 @@
               </a:rPr>
               <a:t>А есть еще TFS, и множество забытых и не очень вариантов...</a:t>
             </a:r>
-            <a:endParaRPr b="0" lang="en-US" sz="1500" spc="-1" strike="noStrike">
+            <a:endParaRPr b="0" lang="ru-RU" sz="1500" spc="-1" strike="noStrike">
               <a:latin typeface="Arial"/>
             </a:endParaRPr>
           </a:p>
@@ -5642,7 +5729,7 @@
         <p:spPr>
           <a:xfrm>
             <a:off x="360000" y="5400000"/>
-            <a:ext cx="10796400" cy="1260000"/>
+            <a:ext cx="10796040" cy="1259640"/>
           </a:xfrm>
           <a:prstGeom prst="rect">
             <a:avLst/>
@@ -5678,7 +5765,7 @@
               </a:rPr>
               <a:t>Основы разработки корпоративных систем на платформе .NET</a:t>
             </a:r>
-            <a:endParaRPr b="0" lang="en-US" sz="2800" spc="-1" strike="noStrike">
+            <a:endParaRPr b="0" lang="ru-RU" sz="2800" spc="-1" strike="noStrike">
               <a:latin typeface="Arial"/>
             </a:endParaRPr>
           </a:p>
@@ -5723,7 +5810,7 @@
         <p:spPr>
           <a:xfrm>
             <a:off x="578160" y="34560"/>
-            <a:ext cx="10796400" cy="1260000"/>
+            <a:ext cx="10796040" cy="1259640"/>
           </a:xfrm>
           <a:prstGeom prst="rect">
             <a:avLst/>
@@ -5759,7 +5846,7 @@
               </a:rPr>
               <a:t>Git-клиенты</a:t>
             </a:r>
-            <a:endParaRPr b="0" lang="en-US" sz="4400" spc="-1" strike="noStrike">
+            <a:endParaRPr b="0" lang="ru-RU" sz="4400" spc="-1" strike="noStrike">
               <a:latin typeface="Arial"/>
             </a:endParaRPr>
           </a:p>
@@ -5774,7 +5861,7 @@
         <p:spPr>
           <a:xfrm>
             <a:off x="578160" y="1368000"/>
-            <a:ext cx="6799680" cy="2143080"/>
+            <a:ext cx="6799320" cy="2142720"/>
           </a:xfrm>
           <a:prstGeom prst="rect">
             <a:avLst/>
@@ -5795,7 +5882,7 @@
             <a:noAutofit/>
           </a:bodyPr>
           <a:p>
-            <a:pPr marL="216000" indent="-214560">
+            <a:pPr marL="216000" indent="-214200">
               <a:lnSpc>
                 <a:spcPct val="100000"/>
               </a:lnSpc>
@@ -5822,12 +5909,12 @@
               </a:rPr>
               <a:t>Visual Studio 2013+ - весьма своенравный «официальный от Microsoft» клиент</a:t>
             </a:r>
-            <a:endParaRPr b="0" lang="en-US" sz="1500" spc="-1" strike="noStrike">
-              <a:latin typeface="Arial"/>
-            </a:endParaRPr>
-          </a:p>
-          <a:p>
-            <a:pPr marL="216000" indent="-214560">
+            <a:endParaRPr b="0" lang="ru-RU" sz="1500" spc="-1" strike="noStrike">
+              <a:latin typeface="Arial"/>
+            </a:endParaRPr>
+          </a:p>
+          <a:p>
+            <a:pPr marL="216000" indent="-214200">
               <a:lnSpc>
                 <a:spcPct val="100000"/>
               </a:lnSpc>
@@ -5854,12 +5941,12 @@
               </a:rPr>
               <a:t>Git Extensions – лично я советую вот этот</a:t>
             </a:r>
-            <a:endParaRPr b="0" lang="en-US" sz="1500" spc="-1" strike="noStrike">
-              <a:latin typeface="Arial"/>
-            </a:endParaRPr>
-          </a:p>
-          <a:p>
-            <a:pPr marL="216000" indent="-214560">
+            <a:endParaRPr b="0" lang="ru-RU" sz="1500" spc="-1" strike="noStrike">
+              <a:latin typeface="Arial"/>
+            </a:endParaRPr>
+          </a:p>
+          <a:p>
+            <a:pPr marL="216000" indent="-214200">
               <a:lnSpc>
                 <a:spcPct val="100000"/>
               </a:lnSpc>
@@ -5886,12 +5973,12 @@
               </a:rPr>
               <a:t>Tortoise Git</a:t>
             </a:r>
-            <a:endParaRPr b="0" lang="en-US" sz="1500" spc="-1" strike="noStrike">
-              <a:latin typeface="Arial"/>
-            </a:endParaRPr>
-          </a:p>
-          <a:p>
-            <a:pPr marL="216000" indent="-214560">
+            <a:endParaRPr b="0" lang="ru-RU" sz="1500" spc="-1" strike="noStrike">
+              <a:latin typeface="Arial"/>
+            </a:endParaRPr>
+          </a:p>
+          <a:p>
+            <a:pPr marL="216000" indent="-214200">
               <a:lnSpc>
                 <a:spcPct val="100000"/>
               </a:lnSpc>
@@ -5918,12 +6005,12 @@
               </a:rPr>
               <a:t>SourceTree</a:t>
             </a:r>
-            <a:endParaRPr b="0" lang="en-US" sz="1500" spc="-1" strike="noStrike">
-              <a:latin typeface="Arial"/>
-            </a:endParaRPr>
-          </a:p>
-          <a:p>
-            <a:pPr marL="216000" indent="-214560">
+            <a:endParaRPr b="0" lang="ru-RU" sz="1500" spc="-1" strike="noStrike">
+              <a:latin typeface="Arial"/>
+            </a:endParaRPr>
+          </a:p>
+          <a:p>
+            <a:pPr marL="216000" indent="-214200">
               <a:lnSpc>
                 <a:spcPct val="100000"/>
               </a:lnSpc>
@@ -5950,12 +6037,12 @@
               </a:rPr>
               <a:t>Bash (или bash tools для Windows CMD)</a:t>
             </a:r>
-            <a:endParaRPr b="0" lang="en-US" sz="1500" spc="-1" strike="noStrike">
-              <a:latin typeface="Arial"/>
-            </a:endParaRPr>
-          </a:p>
-          <a:p>
-            <a:pPr marL="216000" indent="-214560">
+            <a:endParaRPr b="0" lang="ru-RU" sz="1500" spc="-1" strike="noStrike">
+              <a:latin typeface="Arial"/>
+            </a:endParaRPr>
+          </a:p>
+          <a:p>
+            <a:pPr marL="216000" indent="-214200">
               <a:lnSpc>
                 <a:spcPct val="100000"/>
               </a:lnSpc>
@@ -5982,7 +6069,7 @@
               </a:rPr>
               <a:t>...</a:t>
             </a:r>
-            <a:endParaRPr b="0" lang="en-US" sz="1500" spc="-1" strike="noStrike">
+            <a:endParaRPr b="0" lang="ru-RU" sz="1500" spc="-1" strike="noStrike">
               <a:latin typeface="Arial"/>
             </a:endParaRPr>
           </a:p>
@@ -5997,7 +6084,7 @@
         <p:spPr>
           <a:xfrm>
             <a:off x="360000" y="5400000"/>
-            <a:ext cx="10796400" cy="1260000"/>
+            <a:ext cx="10796040" cy="1259640"/>
           </a:xfrm>
           <a:prstGeom prst="rect">
             <a:avLst/>
@@ -6033,7 +6120,7 @@
               </a:rPr>
               <a:t>Основы разработки корпоративных систем на платформе .NET</a:t>
             </a:r>
-            <a:endParaRPr b="0" lang="en-US" sz="2800" spc="-1" strike="noStrike">
+            <a:endParaRPr b="0" lang="ru-RU" sz="2800" spc="-1" strike="noStrike">
               <a:latin typeface="Arial"/>
             </a:endParaRPr>
           </a:p>
@@ -6078,7 +6165,7 @@
         <p:spPr>
           <a:xfrm>
             <a:off x="578160" y="34560"/>
-            <a:ext cx="10796400" cy="1260000"/>
+            <a:ext cx="10796040" cy="1259640"/>
           </a:xfrm>
           <a:prstGeom prst="rect">
             <a:avLst/>
@@ -6114,7 +6201,7 @@
               </a:rPr>
               <a:t>Git Flow</a:t>
             </a:r>
-            <a:endParaRPr b="0" lang="en-US" sz="4400" spc="-1" strike="noStrike">
+            <a:endParaRPr b="0" lang="ru-RU" sz="4400" spc="-1" strike="noStrike">
               <a:latin typeface="Arial"/>
             </a:endParaRPr>
           </a:p>
@@ -6129,7 +6216,7 @@
         <p:spPr>
           <a:xfrm>
             <a:off x="360000" y="5400000"/>
-            <a:ext cx="10796400" cy="1260000"/>
+            <a:ext cx="10796040" cy="1259640"/>
           </a:xfrm>
           <a:prstGeom prst="rect">
             <a:avLst/>
@@ -6165,7 +6252,7 @@
               </a:rPr>
               <a:t>Основы разработки корпоративных систем на платформе .NET</a:t>
             </a:r>
-            <a:endParaRPr b="0" lang="en-US" sz="2800" spc="-1" strike="noStrike">
+            <a:endParaRPr b="0" lang="ru-RU" sz="2800" spc="-1" strike="noStrike">
               <a:latin typeface="Arial"/>
             </a:endParaRPr>
           </a:p>
@@ -6184,7 +6271,7 @@
         <p:spPr>
           <a:xfrm>
             <a:off x="3240000" y="1149120"/>
-            <a:ext cx="5318280" cy="3817440"/>
+            <a:ext cx="5317920" cy="3817080"/>
           </a:xfrm>
           <a:prstGeom prst="rect">
             <a:avLst/>
@@ -6203,7 +6290,7 @@
         <p:spPr>
           <a:xfrm>
             <a:off x="2360880" y="5112000"/>
-            <a:ext cx="7573680" cy="345240"/>
+            <a:ext cx="7573320" cy="344880"/>
           </a:xfrm>
           <a:prstGeom prst="rect">
             <a:avLst/>
@@ -6239,7 +6326,7 @@
               </a:rPr>
               <a:t>https://ru.atlassian.com/git/tutorials/comparing-workflows/gitflow-workflow</a:t>
             </a:r>
-            <a:endParaRPr b="0" lang="en-US" sz="1800" spc="-1" strike="noStrike">
+            <a:endParaRPr b="0" lang="ru-RU" sz="1800" spc="-1" strike="noStrike">
               <a:latin typeface="Arial"/>
             </a:endParaRPr>
           </a:p>
@@ -6284,7 +6371,7 @@
         <p:spPr>
           <a:xfrm>
             <a:off x="578160" y="34560"/>
-            <a:ext cx="10796400" cy="1260000"/>
+            <a:ext cx="10796040" cy="1259640"/>
           </a:xfrm>
           <a:prstGeom prst="rect">
             <a:avLst/>
@@ -6320,7 +6407,7 @@
               </a:rPr>
               <a:t>Azure DevOps</a:t>
             </a:r>
-            <a:endParaRPr b="0" lang="en-US" sz="4400" spc="-1" strike="noStrike">
+            <a:endParaRPr b="0" lang="ru-RU" sz="4400" spc="-1" strike="noStrike">
               <a:latin typeface="Arial"/>
             </a:endParaRPr>
           </a:p>
@@ -6335,7 +6422,7 @@
         <p:spPr>
           <a:xfrm>
             <a:off x="360000" y="5400000"/>
-            <a:ext cx="10796400" cy="1260000"/>
+            <a:ext cx="10796040" cy="1259640"/>
           </a:xfrm>
           <a:prstGeom prst="rect">
             <a:avLst/>
@@ -6371,7 +6458,7 @@
               </a:rPr>
               <a:t>Основы разработки корпоративных систем на платформе .NET</a:t>
             </a:r>
-            <a:endParaRPr b="0" lang="en-US" sz="2800" spc="-1" strike="noStrike">
+            <a:endParaRPr b="0" lang="ru-RU" sz="2800" spc="-1" strike="noStrike">
               <a:latin typeface="Arial"/>
             </a:endParaRPr>
           </a:p>
@@ -6386,7 +6473,7 @@
         <p:spPr>
           <a:xfrm>
             <a:off x="936000" y="1244520"/>
-            <a:ext cx="6468840" cy="2311560"/>
+            <a:ext cx="6468480" cy="2311200"/>
           </a:xfrm>
           <a:prstGeom prst="rect">
             <a:avLst/>
@@ -6407,7 +6494,7 @@
             <a:noAutofit/>
           </a:bodyPr>
           <a:p>
-            <a:pPr marL="216000" indent="-214560">
+            <a:pPr marL="216000" indent="-214200">
               <a:lnSpc>
                 <a:spcPct val="150000"/>
               </a:lnSpc>
@@ -6428,12 +6515,12 @@
               </a:rPr>
               <a:t>Azure DevOps – система для совместной работы от Microsoft</a:t>
             </a:r>
-            <a:endParaRPr b="0" lang="en-US" sz="1500" spc="-1" strike="noStrike">
-              <a:latin typeface="Arial"/>
-            </a:endParaRPr>
-          </a:p>
-          <a:p>
-            <a:pPr marL="216000" indent="-214560">
+            <a:endParaRPr b="0" lang="ru-RU" sz="1500" spc="-1" strike="noStrike">
+              <a:latin typeface="Arial"/>
+            </a:endParaRPr>
+          </a:p>
+          <a:p>
+            <a:pPr marL="216000" indent="-214200">
               <a:lnSpc>
                 <a:spcPct val="150000"/>
               </a:lnSpc>
@@ -6454,12 +6541,12 @@
               </a:rPr>
               <a:t>Old names: Visual Studio Online, Team Foundation Services</a:t>
             </a:r>
-            <a:endParaRPr b="0" lang="en-US" sz="1500" spc="-1" strike="noStrike">
-              <a:latin typeface="Arial"/>
-            </a:endParaRPr>
-          </a:p>
-          <a:p>
-            <a:pPr marL="216000" indent="-214560">
+            <a:endParaRPr b="0" lang="ru-RU" sz="1500" spc="-1" strike="noStrike">
+              <a:latin typeface="Arial"/>
+            </a:endParaRPr>
+          </a:p>
+          <a:p>
+            <a:pPr marL="216000" indent="-214200">
               <a:lnSpc>
                 <a:spcPct val="150000"/>
               </a:lnSpc>
@@ -6480,12 +6567,12 @@
               </a:rPr>
               <a:t>Git-репозитории</a:t>
             </a:r>
-            <a:endParaRPr b="0" lang="en-US" sz="1500" spc="-1" strike="noStrike">
-              <a:latin typeface="Arial"/>
-            </a:endParaRPr>
-          </a:p>
-          <a:p>
-            <a:pPr marL="216000" indent="-214560">
+            <a:endParaRPr b="0" lang="ru-RU" sz="1500" spc="-1" strike="noStrike">
+              <a:latin typeface="Arial"/>
+            </a:endParaRPr>
+          </a:p>
+          <a:p>
+            <a:pPr marL="216000" indent="-214200">
               <a:lnSpc>
                 <a:spcPct val="150000"/>
               </a:lnSpc>
@@ -6506,12 +6593,12 @@
               </a:rPr>
               <a:t>В облаке: https://www.visualstudio.com </a:t>
             </a:r>
-            <a:endParaRPr b="0" lang="en-US" sz="1500" spc="-1" strike="noStrike">
-              <a:latin typeface="Arial"/>
-            </a:endParaRPr>
-          </a:p>
-          <a:p>
-            <a:pPr marL="216000" indent="-214560">
+            <a:endParaRPr b="0" lang="ru-RU" sz="1500" spc="-1" strike="noStrike">
+              <a:latin typeface="Arial"/>
+            </a:endParaRPr>
+          </a:p>
+          <a:p>
+            <a:pPr marL="216000" indent="-214200">
               <a:lnSpc>
                 <a:spcPct val="150000"/>
               </a:lnSpc>
@@ -6532,12 +6619,12 @@
               </a:rPr>
               <a:t>Для установки на сервер называется Team Foundation Server</a:t>
             </a:r>
-            <a:endParaRPr b="0" lang="en-US" sz="1500" spc="-1" strike="noStrike">
-              <a:latin typeface="Arial"/>
-            </a:endParaRPr>
-          </a:p>
-          <a:p>
-            <a:pPr marL="216000" indent="-214560">
+            <a:endParaRPr b="0" lang="ru-RU" sz="1500" spc="-1" strike="noStrike">
+              <a:latin typeface="Arial"/>
+            </a:endParaRPr>
+          </a:p>
+          <a:p>
+            <a:pPr marL="216000" indent="-214200">
               <a:lnSpc>
                 <a:spcPct val="150000"/>
               </a:lnSpc>
@@ -6558,12 +6645,12 @@
               </a:rPr>
               <a:t>Бесплатный тариф до 5 участников проекта</a:t>
             </a:r>
-            <a:endParaRPr b="0" lang="en-US" sz="1500" spc="-1" strike="noStrike">
-              <a:latin typeface="Arial"/>
-            </a:endParaRPr>
-          </a:p>
-          <a:p>
-            <a:pPr marL="216000" indent="-214560">
+            <a:endParaRPr b="0" lang="ru-RU" sz="1500" spc="-1" strike="noStrike">
+              <a:latin typeface="Arial"/>
+            </a:endParaRPr>
+          </a:p>
+          <a:p>
+            <a:pPr marL="216000" indent="-214200">
               <a:lnSpc>
                 <a:spcPct val="150000"/>
               </a:lnSpc>
@@ -6584,7 +6671,7 @@
               </a:rPr>
               <a:t>Task tracker, Builds, CI/CD, Pull Requests, Wiki, Service Hooks,…</a:t>
             </a:r>
-            <a:endParaRPr b="0" lang="en-US" sz="1500" spc="-1" strike="noStrike">
+            <a:endParaRPr b="0" lang="ru-RU" sz="1500" spc="-1" strike="noStrike">
               <a:latin typeface="Arial"/>
             </a:endParaRPr>
           </a:p>
@@ -6629,7 +6716,7 @@
         <p:spPr>
           <a:xfrm>
             <a:off x="578160" y="34560"/>
-            <a:ext cx="10796400" cy="1260000"/>
+            <a:ext cx="10796040" cy="1259640"/>
           </a:xfrm>
           <a:prstGeom prst="rect">
             <a:avLst/>
@@ -6665,7 +6752,7 @@
               </a:rPr>
               <a:t>NuGet packages</a:t>
             </a:r>
-            <a:endParaRPr b="0" lang="en-US" sz="4400" spc="-1" strike="noStrike">
+            <a:endParaRPr b="0" lang="ru-RU" sz="4400" spc="-1" strike="noStrike">
               <a:latin typeface="Arial"/>
             </a:endParaRPr>
           </a:p>
@@ -6680,7 +6767,7 @@
         <p:spPr>
           <a:xfrm>
             <a:off x="360000" y="5400000"/>
-            <a:ext cx="10796400" cy="1260000"/>
+            <a:ext cx="10796040" cy="1259640"/>
           </a:xfrm>
           <a:prstGeom prst="rect">
             <a:avLst/>
@@ -6716,7 +6803,7 @@
               </a:rPr>
               <a:t>Основы разработки корпоративных систем на платформе .NET</a:t>
             </a:r>
-            <a:endParaRPr b="0" lang="en-US" sz="2800" spc="-1" strike="noStrike">
+            <a:endParaRPr b="0" lang="ru-RU" sz="2800" spc="-1" strike="noStrike">
               <a:latin typeface="Arial"/>
             </a:endParaRPr>
           </a:p>
@@ -6731,7 +6818,7 @@
         <p:spPr>
           <a:xfrm>
             <a:off x="936000" y="1244520"/>
-            <a:ext cx="10727640" cy="2311560"/>
+            <a:ext cx="10727280" cy="2311200"/>
           </a:xfrm>
           <a:prstGeom prst="rect">
             <a:avLst/>
@@ -6752,7 +6839,7 @@
             <a:noAutofit/>
           </a:bodyPr>
           <a:p>
-            <a:pPr marL="216000" indent="-214560">
+            <a:pPr marL="216000" indent="-214200">
               <a:lnSpc>
                 <a:spcPct val="150000"/>
               </a:lnSpc>
@@ -6773,12 +6860,12 @@
               </a:rPr>
               <a:t>Архив, версионируется, разделяется по платформам.</a:t>
             </a:r>
-            <a:endParaRPr b="0" lang="en-US" sz="1500" spc="-1" strike="noStrike">
-              <a:latin typeface="Arial"/>
-            </a:endParaRPr>
-          </a:p>
-          <a:p>
-            <a:pPr marL="216000" indent="-214560">
+            <a:endParaRPr b="0" lang="ru-RU" sz="1500" spc="-1" strike="noStrike">
+              <a:latin typeface="Arial"/>
+            </a:endParaRPr>
+          </a:p>
+          <a:p>
+            <a:pPr marL="216000" indent="-214200">
               <a:lnSpc>
                 <a:spcPct val="150000"/>
               </a:lnSpc>
@@ -6799,12 +6886,12 @@
               </a:rPr>
               <a:t>Собирается командой dotnet pack</a:t>
             </a:r>
-            <a:endParaRPr b="0" lang="en-US" sz="1500" spc="-1" strike="noStrike">
-              <a:latin typeface="Arial"/>
-            </a:endParaRPr>
-          </a:p>
-          <a:p>
-            <a:pPr marL="216000" indent="-214560">
+            <a:endParaRPr b="0" lang="ru-RU" sz="1500" spc="-1" strike="noStrike">
+              <a:latin typeface="Arial"/>
+            </a:endParaRPr>
+          </a:p>
+          <a:p>
+            <a:pPr marL="216000" indent="-214200">
               <a:lnSpc>
                 <a:spcPct val="150000"/>
               </a:lnSpc>
@@ -6825,12 +6912,12 @@
               </a:rPr>
               <a:t>Загружается в feed командой dotnet push</a:t>
             </a:r>
-            <a:endParaRPr b="0" lang="en-US" sz="1500" spc="-1" strike="noStrike">
-              <a:latin typeface="Arial"/>
-            </a:endParaRPr>
-          </a:p>
-          <a:p>
-            <a:pPr marL="216000" indent="-214560">
+            <a:endParaRPr b="0" lang="ru-RU" sz="1500" spc="-1" strike="noStrike">
+              <a:latin typeface="Arial"/>
+            </a:endParaRPr>
+          </a:p>
+          <a:p>
+            <a:pPr marL="216000" indent="-214200">
               <a:lnSpc>
                 <a:spcPct val="150000"/>
               </a:lnSpc>
@@ -6851,12 +6938,12 @@
               </a:rPr>
               <a:t>.nuspec — файл, описывающий пакет NuGet в старых версия .NET</a:t>
             </a:r>
-            <a:endParaRPr b="0" lang="en-US" sz="1500" spc="-1" strike="noStrike">
-              <a:latin typeface="Arial"/>
-            </a:endParaRPr>
-          </a:p>
-          <a:p>
-            <a:pPr marL="216000" indent="-214560">
+            <a:endParaRPr b="0" lang="ru-RU" sz="1500" spc="-1" strike="noStrike">
+              <a:latin typeface="Arial"/>
+            </a:endParaRPr>
+          </a:p>
+          <a:p>
+            <a:pPr marL="216000" indent="-214200">
               <a:lnSpc>
                 <a:spcPct val="150000"/>
               </a:lnSpc>
@@ -6877,12 +6964,12 @@
               </a:rPr>
               <a:t>В dotnet core 3.1 эти данные расположены в csproj файле проекта</a:t>
             </a:r>
-            <a:endParaRPr b="0" lang="en-US" sz="1500" spc="-1" strike="noStrike">
-              <a:latin typeface="Arial"/>
-            </a:endParaRPr>
-          </a:p>
-          <a:p>
-            <a:pPr marL="216000" indent="-214560">
+            <a:endParaRPr b="0" lang="ru-RU" sz="1500" spc="-1" strike="noStrike">
+              <a:latin typeface="Arial"/>
+            </a:endParaRPr>
+          </a:p>
+          <a:p>
+            <a:pPr marL="216000" indent="-214200">
               <a:lnSpc>
                 <a:spcPct val="150000"/>
               </a:lnSpc>
@@ -6915,7 +7002,7 @@
               </a:rPr>
               <a:t>https://docs.microsoft.com/ru-ru/nuget/reference/nuspec</a:t>
             </a:r>
-            <a:endParaRPr b="0" lang="en-US" sz="1500" spc="-1" strike="noStrike">
+            <a:endParaRPr b="0" lang="ru-RU" sz="1500" spc="-1" strike="noStrike">
               <a:latin typeface="Arial"/>
             </a:endParaRPr>
           </a:p>
@@ -6925,7 +7012,7 @@
                 <a:spcPct val="150000"/>
               </a:lnSpc>
             </a:pPr>
-            <a:endParaRPr b="0" lang="en-US" sz="1500" spc="-1" strike="noStrike">
+            <a:endParaRPr b="0" lang="ru-RU" sz="1500" spc="-1" strike="noStrike">
               <a:latin typeface="Arial"/>
             </a:endParaRPr>
           </a:p>
@@ -6970,7 +7057,7 @@
         <p:spPr>
           <a:xfrm>
             <a:off x="578160" y="34560"/>
-            <a:ext cx="10796040" cy="1259640"/>
+            <a:ext cx="10795680" cy="1259280"/>
           </a:xfrm>
           <a:prstGeom prst="rect">
             <a:avLst/>
@@ -7006,7 +7093,7 @@
               </a:rPr>
               <a:t>Continuous Integration</a:t>
             </a:r>
-            <a:endParaRPr b="0" lang="en-US" sz="4400" spc="-1" strike="noStrike">
+            <a:endParaRPr b="0" lang="ru-RU" sz="4400" spc="-1" strike="noStrike">
               <a:latin typeface="Arial"/>
             </a:endParaRPr>
           </a:p>
@@ -7021,7 +7108,7 @@
         <p:spPr>
           <a:xfrm>
             <a:off x="521280" y="921600"/>
-            <a:ext cx="6799320" cy="4122360"/>
+            <a:ext cx="6798960" cy="4122000"/>
           </a:xfrm>
           <a:prstGeom prst="rect">
             <a:avLst/>
@@ -7042,7 +7129,7 @@
             <a:noAutofit/>
           </a:bodyPr>
           <a:p>
-            <a:pPr marL="216000" indent="-214200">
+            <a:pPr marL="216000" indent="-213840">
               <a:lnSpc>
                 <a:spcPct val="100000"/>
               </a:lnSpc>
@@ -7069,12 +7156,12 @@
               </a:rPr>
               <a:t>Master, develop, release, support ветки закрыты для прямых изменений (только через PR)</a:t>
             </a:r>
-            <a:endParaRPr b="0" lang="en-US" sz="1500" spc="-1" strike="noStrike">
-              <a:latin typeface="Arial"/>
-            </a:endParaRPr>
-          </a:p>
-          <a:p>
-            <a:pPr marL="216000" indent="-214200">
+            <a:endParaRPr b="0" lang="ru-RU" sz="1500" spc="-1" strike="noStrike">
+              <a:latin typeface="Arial"/>
+            </a:endParaRPr>
+          </a:p>
+          <a:p>
+            <a:pPr marL="216000" indent="-213840">
               <a:lnSpc>
                 <a:spcPct val="100000"/>
               </a:lnSpc>
@@ -7101,12 +7188,12 @@
               </a:rPr>
               <a:t>Master (develop) ветка собирается каждый коммит</a:t>
             </a:r>
-            <a:endParaRPr b="0" lang="en-US" sz="1500" spc="-1" strike="noStrike">
-              <a:latin typeface="Arial"/>
-            </a:endParaRPr>
-          </a:p>
-          <a:p>
-            <a:pPr marL="216000" indent="-214200">
+            <a:endParaRPr b="0" lang="ru-RU" sz="1500" spc="-1" strike="noStrike">
+              <a:latin typeface="Arial"/>
+            </a:endParaRPr>
+          </a:p>
+          <a:p>
+            <a:pPr marL="216000" indent="-213840">
               <a:lnSpc>
                 <a:spcPct val="100000"/>
               </a:lnSpc>
@@ -7133,12 +7220,12 @@
               </a:rPr>
               <a:t>Сборка включает как минимум юнит-тесты (и UI, если есть)</a:t>
             </a:r>
-            <a:endParaRPr b="0" lang="en-US" sz="1500" spc="-1" strike="noStrike">
-              <a:latin typeface="Arial"/>
-            </a:endParaRPr>
-          </a:p>
-          <a:p>
-            <a:pPr marL="216000" indent="-214200">
+            <a:endParaRPr b="0" lang="ru-RU" sz="1500" spc="-1" strike="noStrike">
+              <a:latin typeface="Arial"/>
+            </a:endParaRPr>
+          </a:p>
+          <a:p>
+            <a:pPr marL="216000" indent="-213840">
               <a:lnSpc>
                 <a:spcPct val="100000"/>
               </a:lnSpc>
@@ -7165,12 +7252,12 @@
               </a:rPr>
               <a:t>Набор тестов под коммит должны быть быстрым! (да, 15 минут это относительно быстро)</a:t>
             </a:r>
-            <a:endParaRPr b="0" lang="en-US" sz="1500" spc="-1" strike="noStrike">
-              <a:latin typeface="Arial"/>
-            </a:endParaRPr>
-          </a:p>
-          <a:p>
-            <a:pPr marL="216000" indent="-214200">
+            <a:endParaRPr b="0" lang="ru-RU" sz="1500" spc="-1" strike="noStrike">
+              <a:latin typeface="Arial"/>
+            </a:endParaRPr>
+          </a:p>
+          <a:p>
+            <a:pPr marL="216000" indent="-213840">
               <a:lnSpc>
                 <a:spcPct val="100000"/>
               </a:lnSpc>
@@ -7197,12 +7284,12 @@
               </a:rPr>
               <a:t>Полный набор тестов (интеграционные, регрессия, UI) собираются минимум раз в сутки</a:t>
             </a:r>
-            <a:endParaRPr b="0" lang="en-US" sz="1500" spc="-1" strike="noStrike">
-              <a:latin typeface="Arial"/>
-            </a:endParaRPr>
-          </a:p>
-          <a:p>
-            <a:pPr marL="216000" indent="-214200">
+            <a:endParaRPr b="0" lang="ru-RU" sz="1500" spc="-1" strike="noStrike">
+              <a:latin typeface="Arial"/>
+            </a:endParaRPr>
+          </a:p>
+          <a:p>
+            <a:pPr marL="216000" indent="-213840">
               <a:lnSpc>
                 <a:spcPct val="100000"/>
               </a:lnSpc>
@@ -7229,12 +7316,12 @@
               </a:rPr>
               <a:t>Упавший билд – это критичная бага</a:t>
             </a:r>
-            <a:endParaRPr b="0" lang="en-US" sz="1500" spc="-1" strike="noStrike">
-              <a:latin typeface="Arial"/>
-            </a:endParaRPr>
-          </a:p>
-          <a:p>
-            <a:pPr marL="216000" indent="-214200">
+            <a:endParaRPr b="0" lang="ru-RU" sz="1500" spc="-1" strike="noStrike">
+              <a:latin typeface="Arial"/>
+            </a:endParaRPr>
+          </a:p>
+          <a:p>
+            <a:pPr marL="216000" indent="-213840">
               <a:lnSpc>
                 <a:spcPct val="100000"/>
               </a:lnSpc>
@@ -7261,7 +7348,7 @@
               </a:rPr>
               <a:t>Релиз на CI-сервер как минимум каждую ночь, лучше каждый пул-реквест – автоматически</a:t>
             </a:r>
-            <a:endParaRPr b="0" lang="en-US" sz="1500" spc="-1" strike="noStrike">
+            <a:endParaRPr b="0" lang="ru-RU" sz="1500" spc="-1" strike="noStrike">
               <a:latin typeface="Arial"/>
             </a:endParaRPr>
           </a:p>
@@ -7276,7 +7363,7 @@
         <p:spPr>
           <a:xfrm>
             <a:off x="360000" y="5400000"/>
-            <a:ext cx="10796040" cy="1259640"/>
+            <a:ext cx="10795680" cy="1259280"/>
           </a:xfrm>
           <a:prstGeom prst="rect">
             <a:avLst/>
@@ -7312,7 +7399,7 @@
               </a:rPr>
               <a:t>Основы разработки корпоративных систем на платформе .NET</a:t>
             </a:r>
-            <a:endParaRPr b="0" lang="en-US" sz="2800" spc="-1" strike="noStrike">
+            <a:endParaRPr b="0" lang="ru-RU" sz="2800" spc="-1" strike="noStrike">
               <a:latin typeface="Arial"/>
             </a:endParaRPr>
           </a:p>
@@ -7357,7 +7444,7 @@
         <p:spPr>
           <a:xfrm>
             <a:off x="144000" y="34560"/>
-            <a:ext cx="11853000" cy="1259640"/>
+            <a:ext cx="11852640" cy="1259280"/>
           </a:xfrm>
           <a:prstGeom prst="rect">
             <a:avLst/>
@@ -7393,7 +7480,7 @@
               </a:rPr>
               <a:t>Continuous Delivery vs Continuous Deployment</a:t>
             </a:r>
-            <a:endParaRPr b="0" lang="en-US" sz="4400" spc="-1" strike="noStrike">
+            <a:endParaRPr b="0" lang="ru-RU" sz="4400" spc="-1" strike="noStrike">
               <a:latin typeface="Arial"/>
             </a:endParaRPr>
           </a:p>
@@ -7408,7 +7495,7 @@
         <p:spPr>
           <a:xfrm>
             <a:off x="360000" y="5400000"/>
-            <a:ext cx="10796040" cy="1259640"/>
+            <a:ext cx="10795680" cy="1259280"/>
           </a:xfrm>
           <a:prstGeom prst="rect">
             <a:avLst/>
@@ -7444,7 +7531,7 @@
               </a:rPr>
               <a:t>Основы разработки корпоративных систем на платформе .NET</a:t>
             </a:r>
-            <a:endParaRPr b="0" lang="en-US" sz="2800" spc="-1" strike="noStrike">
+            <a:endParaRPr b="0" lang="ru-RU" sz="2800" spc="-1" strike="noStrike">
               <a:latin typeface="Arial"/>
             </a:endParaRPr>
           </a:p>
@@ -7459,7 +7546,7 @@
         <p:spPr>
           <a:xfrm>
             <a:off x="3600000" y="4605480"/>
-            <a:ext cx="5182560" cy="488520"/>
+            <a:ext cx="5182200" cy="488160"/>
           </a:xfrm>
           <a:prstGeom prst="rect">
             <a:avLst/>
@@ -7495,7 +7582,7 @@
               </a:rPr>
               <a:t>https://notafactoryanymore.com/tag/continuous-deployment/</a:t>
             </a:r>
-            <a:endParaRPr b="0" lang="en-US" sz="1400" spc="-1" strike="noStrike">
+            <a:endParaRPr b="0" lang="ru-RU" sz="1400" spc="-1" strike="noStrike">
               <a:latin typeface="Arial"/>
             </a:endParaRPr>
           </a:p>
@@ -7514,7 +7601,7 @@
         <p:spPr>
           <a:xfrm>
             <a:off x="1656000" y="1008000"/>
-            <a:ext cx="8995680" cy="3588840"/>
+            <a:ext cx="8995320" cy="3588480"/>
           </a:xfrm>
           <a:prstGeom prst="rect">
             <a:avLst/>
@@ -7563,7 +7650,7 @@
         <p:spPr>
           <a:xfrm>
             <a:off x="144000" y="34560"/>
-            <a:ext cx="11853000" cy="1259640"/>
+            <a:ext cx="11852640" cy="1259280"/>
           </a:xfrm>
           <a:prstGeom prst="rect">
             <a:avLst/>
@@ -7599,7 +7686,7 @@
               </a:rPr>
               <a:t>DevOps</a:t>
             </a:r>
-            <a:endParaRPr b="0" lang="en-US" sz="4400" spc="-1" strike="noStrike">
+            <a:endParaRPr b="0" lang="ru-RU" sz="4400" spc="-1" strike="noStrike">
               <a:latin typeface="Arial"/>
             </a:endParaRPr>
           </a:p>
@@ -7614,7 +7701,7 @@
         <p:spPr>
           <a:xfrm>
             <a:off x="360000" y="5400000"/>
-            <a:ext cx="10796040" cy="1259640"/>
+            <a:ext cx="10795680" cy="1259280"/>
           </a:xfrm>
           <a:prstGeom prst="rect">
             <a:avLst/>
@@ -7650,7 +7737,7 @@
               </a:rPr>
               <a:t>Основы разработки корпоративных систем на платформе .NET</a:t>
             </a:r>
-            <a:endParaRPr b="0" lang="en-US" sz="2800" spc="-1" strike="noStrike">
+            <a:endParaRPr b="0" lang="ru-RU" sz="2800" spc="-1" strike="noStrike">
               <a:latin typeface="Arial"/>
             </a:endParaRPr>
           </a:p>
@@ -7665,7 +7752,7 @@
         <p:spPr>
           <a:xfrm>
             <a:off x="3600000" y="4605480"/>
-            <a:ext cx="5182560" cy="488520"/>
+            <a:ext cx="5182200" cy="488160"/>
           </a:xfrm>
           <a:prstGeom prst="rect">
             <a:avLst/>
@@ -7701,7 +7788,7 @@
               </a:rPr>
               <a:t>https://blog.xebialabs.com/2016/03/21/essential-devops-terms/</a:t>
             </a:r>
-            <a:endParaRPr b="0" lang="en-US" sz="1400" spc="-1" strike="noStrike">
+            <a:endParaRPr b="0" lang="ru-RU" sz="1400" spc="-1" strike="noStrike">
               <a:latin typeface="Arial"/>
             </a:endParaRPr>
           </a:p>
@@ -7720,7 +7807,7 @@
         <p:spPr>
           <a:xfrm>
             <a:off x="2304000" y="1080000"/>
-            <a:ext cx="7199280" cy="3435480"/>
+            <a:ext cx="7198920" cy="3435120"/>
           </a:xfrm>
           <a:prstGeom prst="rect">
             <a:avLst/>

</xml_diff>